<commit_message>
Review das aulas do primerio semestre finalizada
</commit_message>
<xml_diff>
--- a/2º Semestre/Aula 00 - Aula Magna e Orientações - Copia/Aula 00 - Aula Magna e Orientações v2.pptx
+++ b/2º Semestre/Aula 00 - Aula Magna e Orientações - Copia/Aula 00 - Aula Magna e Orientações v2.pptx
@@ -6,7 +6,7 @@
     <p:sldMasterId id="2147483699" r:id="rId2"/>
   </p:sldMasterIdLst>
   <p:notesMasterIdLst>
-    <p:notesMasterId r:id="rId13"/>
+    <p:notesMasterId r:id="rId14"/>
   </p:notesMasterIdLst>
   <p:sldIdLst>
     <p:sldId id="398" r:id="rId3"/>
@@ -16,9 +16,10 @@
     <p:sldId id="402" r:id="rId7"/>
     <p:sldId id="814" r:id="rId8"/>
     <p:sldId id="815" r:id="rId9"/>
-    <p:sldId id="405" r:id="rId10"/>
-    <p:sldId id="403" r:id="rId11"/>
-    <p:sldId id="812" r:id="rId12"/>
+    <p:sldId id="830" r:id="rId10"/>
+    <p:sldId id="405" r:id="rId11"/>
+    <p:sldId id="403" r:id="rId12"/>
+    <p:sldId id="812" r:id="rId13"/>
   </p:sldIdLst>
   <p:sldSz cx="9144000" cy="6858000" type="screen4x3"/>
   <p:notesSz cx="6858000" cy="9144000"/>
@@ -219,7 +220,7 @@
             <a:fld id="{4EA5E1ED-E65E-440E-8A4B-5F5DC973F797}" type="datetimeFigureOut">
               <a:rPr lang="pt-BR" smtClean="0"/>
               <a:pPr/>
-              <a:t>27/07/2023</a:t>
+              <a:t>02/08/2023</a:t>
             </a:fld>
             <a:endParaRPr lang="pt-BR"/>
           </a:p>
@@ -636,7 +637,7 @@
           <a:p>
             <a:fld id="{1787AD07-0C2A-424C-83EF-FCCF4A0D3BA0}" type="datetime1">
               <a:rPr lang="pt-BR" smtClean="0"/>
-              <a:t>27/07/2023</a:t>
+              <a:t>02/08/2023</a:t>
             </a:fld>
             <a:endParaRPr lang="pt-BR"/>
           </a:p>
@@ -805,7 +806,7 @@
           <a:p>
             <a:fld id="{2F92FB66-59C8-46A5-AD82-5DAAFD2DC390}" type="datetime1">
               <a:rPr lang="pt-BR" smtClean="0"/>
-              <a:t>27/07/2023</a:t>
+              <a:t>02/08/2023</a:t>
             </a:fld>
             <a:endParaRPr lang="pt-BR"/>
           </a:p>
@@ -984,7 +985,7 @@
           <a:p>
             <a:fld id="{3D5CC8D2-C61E-4471-AD68-1C0D45A8EAFC}" type="datetime1">
               <a:rPr lang="pt-BR" smtClean="0"/>
-              <a:t>27/07/2023</a:t>
+              <a:t>02/08/2023</a:t>
             </a:fld>
             <a:endParaRPr lang="pt-BR"/>
           </a:p>
@@ -1127,7 +1128,7 @@
           <a:p>
             <a:fld id="{C3E38981-C08A-4A29-B885-392FB4EE0709}" type="datetime1">
               <a:rPr lang="pt-BR" smtClean="0"/>
-              <a:t>27/07/2023</a:t>
+              <a:t>02/08/2023</a:t>
             </a:fld>
             <a:endParaRPr lang="en-US" dirty="0"/>
           </a:p>
@@ -1512,7 +1513,7 @@
           <a:p>
             <a:fld id="{2CFE63D7-5B4A-40A4-8FD4-EA63D1010EB7}" type="datetime1">
               <a:rPr lang="pt-BR" smtClean="0"/>
-              <a:t>27/07/2023</a:t>
+              <a:t>02/08/2023</a:t>
             </a:fld>
             <a:endParaRPr lang="en-US" dirty="0"/>
           </a:p>
@@ -1734,7 +1735,7 @@
           <a:p>
             <a:fld id="{A9719147-5557-4D76-A2C3-BF25882771D2}" type="datetime1">
               <a:rPr lang="pt-BR" smtClean="0"/>
-              <a:t>27/07/2023</a:t>
+              <a:t>02/08/2023</a:t>
             </a:fld>
             <a:endParaRPr lang="en-US" dirty="0"/>
           </a:p>
@@ -2047,7 +2048,7 @@
           <a:p>
             <a:fld id="{66250340-7104-44A8-88A9-88532CCE9C1C}" type="datetime1">
               <a:rPr lang="pt-BR" smtClean="0"/>
-              <a:t>27/07/2023</a:t>
+              <a:t>02/08/2023</a:t>
             </a:fld>
             <a:endParaRPr lang="en-US" dirty="0"/>
           </a:p>
@@ -2232,7 +2233,7 @@
           <a:p>
             <a:fld id="{D047EA32-7810-48BE-A9BB-EA3D8AA5AD34}" type="datetime1">
               <a:rPr lang="pt-BR" smtClean="0"/>
-              <a:t>27/07/2023</a:t>
+              <a:t>02/08/2023</a:t>
             </a:fld>
             <a:endParaRPr lang="en-US" dirty="0"/>
           </a:p>
@@ -2380,7 +2381,7 @@
           <a:p>
             <a:fld id="{7C28E9E9-B91F-400E-BE43-87BB4B5C6F4E}" type="datetime1">
               <a:rPr lang="pt-BR" smtClean="0"/>
-              <a:t>27/07/2023</a:t>
+              <a:t>02/08/2023</a:t>
             </a:fld>
             <a:endParaRPr lang="en-US" dirty="0"/>
           </a:p>
@@ -2632,7 +2633,7 @@
           <a:p>
             <a:fld id="{A9E773EA-BFD5-41D4-8CCD-2C9F67DAB481}" type="datetime1">
               <a:rPr lang="pt-BR" smtClean="0"/>
-              <a:t>27/07/2023</a:t>
+              <a:t>02/08/2023</a:t>
             </a:fld>
             <a:endParaRPr lang="pt-BR" dirty="0"/>
           </a:p>
@@ -2834,7 +2835,7 @@
           <a:p>
             <a:fld id="{DAA7C8B6-CF57-4A95-AF6C-A77E6C230ED3}" type="datetime1">
               <a:rPr lang="pt-BR" smtClean="0"/>
-              <a:t>27/07/2023</a:t>
+              <a:t>02/08/2023</a:t>
             </a:fld>
             <a:endParaRPr lang="pt-BR"/>
           </a:p>
@@ -3118,7 +3119,7 @@
           <a:p>
             <a:fld id="{34D50989-24C8-4023-9B0D-A6D249548FD9}" type="datetime1">
               <a:rPr lang="pt-BR" smtClean="0"/>
-              <a:t>27/07/2023</a:t>
+              <a:t>02/08/2023</a:t>
             </a:fld>
             <a:endParaRPr lang="pt-BR"/>
           </a:p>
@@ -3354,7 +3355,7 @@
           <a:p>
             <a:fld id="{8D9BC96A-9776-4585-A439-BC9E2DA226C1}" type="datetime1">
               <a:rPr lang="pt-BR" smtClean="0"/>
-              <a:t>27/07/2023</a:t>
+              <a:t>02/08/2023</a:t>
             </a:fld>
             <a:endParaRPr lang="pt-BR"/>
           </a:p>
@@ -3737,7 +3738,7 @@
           <a:p>
             <a:fld id="{7D12BE36-2922-4567-BD67-201EFA21BF6D}" type="datetime1">
               <a:rPr lang="pt-BR" smtClean="0"/>
-              <a:t>27/07/2023</a:t>
+              <a:t>02/08/2023</a:t>
             </a:fld>
             <a:endParaRPr lang="pt-BR"/>
           </a:p>
@@ -3849,7 +3850,7 @@
           <a:p>
             <a:fld id="{E5B462A9-4B1E-4013-BFB1-FC92225AC2F2}" type="datetime1">
               <a:rPr lang="pt-BR" smtClean="0"/>
-              <a:t>27/07/2023</a:t>
+              <a:t>02/08/2023</a:t>
             </a:fld>
             <a:endParaRPr lang="pt-BR"/>
           </a:p>
@@ -3933,7 +3934,7 @@
           <a:p>
             <a:fld id="{D0E6EC7A-67E7-4978-9BAE-C8F82A40B13B}" type="datetime1">
               <a:rPr lang="pt-BR" smtClean="0"/>
-              <a:t>27/07/2023</a:t>
+              <a:t>02/08/2023</a:t>
             </a:fld>
             <a:endParaRPr lang="pt-BR"/>
           </a:p>
@@ -4215,7 +4216,7 @@
           <a:p>
             <a:fld id="{6E085A4E-80B8-47DD-9D9B-8E1B205CBB30}" type="datetime1">
               <a:rPr lang="pt-BR" smtClean="0"/>
-              <a:t>27/07/2023</a:t>
+              <a:t>02/08/2023</a:t>
             </a:fld>
             <a:endParaRPr lang="pt-BR"/>
           </a:p>
@@ -4474,7 +4475,7 @@
           <a:p>
             <a:fld id="{F4E9A02C-D9AD-4B8C-9B93-B0980E8E86EB}" type="datetime1">
               <a:rPr lang="pt-BR" smtClean="0"/>
-              <a:t>27/07/2023</a:t>
+              <a:t>02/08/2023</a:t>
             </a:fld>
             <a:endParaRPr lang="pt-BR"/>
           </a:p>
@@ -4686,7 +4687,7 @@
           <a:p>
             <a:fld id="{202762D0-3A59-4B14-83BA-8E0FC8A60AB1}" type="datetime1">
               <a:rPr lang="pt-BR" smtClean="0"/>
-              <a:t>27/07/2023</a:t>
+              <a:t>02/08/2023</a:t>
             </a:fld>
             <a:endParaRPr lang="pt-BR"/>
           </a:p>
@@ -5546,6 +5547,126 @@
       </p:grpSpPr>
       <p:sp>
         <p:nvSpPr>
+          <p:cNvPr id="9" name="TextBox 6">
+            <a:extLst>
+              <a:ext uri="{FF2B5EF4-FFF2-40B4-BE49-F238E27FC236}">
+                <a16:creationId xmlns:a16="http://schemas.microsoft.com/office/drawing/2014/main" id="{225765AD-71F7-DC36-6CE8-E9873BEE1F3F}"/>
+              </a:ext>
+            </a:extLst>
+          </p:cNvPr>
+          <p:cNvSpPr txBox="1"/>
+          <p:nvPr/>
+        </p:nvSpPr>
+        <p:spPr>
+          <a:xfrm>
+            <a:off x="228600" y="133350"/>
+            <a:ext cx="6324600" cy="707886"/>
+          </a:xfrm>
+          <a:prstGeom prst="rect">
+            <a:avLst/>
+          </a:prstGeom>
+          <a:noFill/>
+        </p:spPr>
+        <p:txBody>
+          <a:bodyPr wrap="square" rtlCol="0">
+            <a:spAutoFit/>
+          </a:bodyPr>
+          <a:lstStyle/>
+          <a:p>
+            <a:r>
+              <a:rPr lang="pt-BR" sz="4000" dirty="0" err="1">
+                <a:solidFill>
+                  <a:srgbClr val="ED145B"/>
+                </a:solidFill>
+                <a:latin typeface="Gotham HTF" pitchFamily="50" charset="0"/>
+                <a:cs typeface="Gotham HTF Light"/>
+              </a:rPr>
+              <a:t>Bibliográfia</a:t>
+            </a:r>
+            <a:endParaRPr lang="pt-BR" sz="4000" dirty="0">
+              <a:solidFill>
+                <a:srgbClr val="ED145B"/>
+              </a:solidFill>
+              <a:latin typeface="Gotham HTF" pitchFamily="50" charset="0"/>
+              <a:cs typeface="Gotham HTF Light"/>
+            </a:endParaRPr>
+          </a:p>
+        </p:txBody>
+      </p:sp>
+      <p:pic>
+        <p:nvPicPr>
+          <p:cNvPr id="7" name="Imagem 6">
+            <a:extLst>
+              <a:ext uri="{FF2B5EF4-FFF2-40B4-BE49-F238E27FC236}">
+                <a16:creationId xmlns:a16="http://schemas.microsoft.com/office/drawing/2014/main" id="{A7BE0070-EA4B-7AC3-A077-DFC3A66F6F07}"/>
+              </a:ext>
+            </a:extLst>
+          </p:cNvPr>
+          <p:cNvPicPr>
+            <a:picLocks noChangeAspect="1"/>
+          </p:cNvPicPr>
+          <p:nvPr/>
+        </p:nvPicPr>
+        <p:blipFill>
+          <a:blip r:embed="rId2"/>
+          <a:stretch>
+            <a:fillRect/>
+          </a:stretch>
+        </p:blipFill>
+        <p:spPr>
+          <a:xfrm>
+            <a:off x="216024" y="1572056"/>
+            <a:ext cx="8532440" cy="4000632"/>
+          </a:xfrm>
+          <a:prstGeom prst="rect">
+            <a:avLst/>
+          </a:prstGeom>
+        </p:spPr>
+      </p:pic>
+    </p:spTree>
+    <p:extLst>
+      <p:ext uri="{BB962C8B-B14F-4D97-AF65-F5344CB8AC3E}">
+        <p14:creationId xmlns:p14="http://schemas.microsoft.com/office/powerpoint/2010/main" val="1861455873"/>
+      </p:ext>
+    </p:extLst>
+  </p:cSld>
+  <p:clrMapOvr>
+    <a:masterClrMapping/>
+  </p:clrMapOvr>
+  <mc:AlternateContent xmlns:mc="http://schemas.openxmlformats.org/markup-compatibility/2006" xmlns:p14="http://schemas.microsoft.com/office/powerpoint/2010/main">
+    <mc:Choice Requires="p14">
+      <p:transition spd="med" p14:dur="700">
+        <p:fade/>
+      </p:transition>
+    </mc:Choice>
+    <mc:Fallback xmlns="">
+      <p:transition spd="med">
+        <p:fade/>
+      </p:transition>
+    </mc:Fallback>
+  </mc:AlternateContent>
+</p:sld>
+</file>
+
+<file path=ppt/slides/slide11.xml><?xml version="1.0" encoding="utf-8"?>
+<p:sld xmlns:a="http://schemas.openxmlformats.org/drawingml/2006/main" xmlns:r="http://schemas.openxmlformats.org/officeDocument/2006/relationships" xmlns:p="http://schemas.openxmlformats.org/presentationml/2006/main">
+  <p:cSld>
+    <p:spTree>
+      <p:nvGrpSpPr>
+        <p:cNvPr id="1" name=""/>
+        <p:cNvGrpSpPr/>
+        <p:nvPr/>
+      </p:nvGrpSpPr>
+      <p:grpSpPr>
+        <a:xfrm>
+          <a:off x="0" y="0"/>
+          <a:ext cx="0" cy="0"/>
+          <a:chOff x="0" y="0"/>
+          <a:chExt cx="0" cy="0"/>
+        </a:xfrm>
+      </p:grpSpPr>
+      <p:sp>
+        <p:nvSpPr>
           <p:cNvPr id="8" name="Título 7">
             <a:extLst>
               <a:ext uri="{FF2B5EF4-FFF2-40B4-BE49-F238E27FC236}">
@@ -5712,7 +5833,7 @@
             <a:fld id="{3F951EF7-2A75-44A0-8045-6A6595E5FF16}" type="slidenum">
               <a:rPr lang="pt-BR" smtClean="0"/>
               <a:pPr/>
-              <a:t>10</a:t>
+              <a:t>11</a:t>
             </a:fld>
             <a:endParaRPr lang="pt-BR" dirty="0"/>
           </a:p>
@@ -7709,7 +7830,7 @@
         <p:spPr>
           <a:xfrm>
             <a:off x="1098788" y="1664886"/>
-            <a:ext cx="4625340" cy="3276282"/>
+            <a:ext cx="4625340" cy="3737946"/>
           </a:xfrm>
           <a:prstGeom prst="rect">
             <a:avLst/>
@@ -7790,6 +7911,46 @@
                 <a:cs typeface="Gotham HTF Light"/>
               </a:rPr>
               <a:t>Checkpoints;</a:t>
+            </a:r>
+          </a:p>
+          <a:p>
+            <a:pPr marL="285750" indent="-285750">
+              <a:lnSpc>
+                <a:spcPct val="150000"/>
+              </a:lnSpc>
+              <a:buClr>
+                <a:srgbClr val="ED265B"/>
+              </a:buClr>
+              <a:buFont typeface="Wingdings" panose="05000000000000000000" pitchFamily="2" charset="2"/>
+              <a:buChar char="Ø"/>
+            </a:pPr>
+            <a:r>
+              <a:rPr lang="en-US" sz="2000" dirty="0" err="1">
+                <a:latin typeface="Gotham HTF Light"/>
+                <a:cs typeface="Gotham HTF Light"/>
+              </a:rPr>
+              <a:t>Datas</a:t>
+            </a:r>
+            <a:r>
+              <a:rPr lang="en-US" sz="2000" dirty="0">
+                <a:latin typeface="Gotham HTF Light"/>
+                <a:cs typeface="Gotham HTF Light"/>
+              </a:rPr>
+              <a:t> </a:t>
+            </a:r>
+            <a:r>
+              <a:rPr lang="en-US" sz="2000" dirty="0" err="1">
+                <a:latin typeface="Gotham HTF Light"/>
+                <a:cs typeface="Gotham HTF Light"/>
+              </a:rPr>
+              <a:t>importantes</a:t>
+            </a:r>
+            <a:r>
+              <a:rPr lang="en-US" sz="2000" dirty="0">
+                <a:latin typeface="Gotham HTF Light"/>
+                <a:cs typeface="Gotham HTF Light"/>
+              </a:rPr>
+              <a:t>;</a:t>
             </a:r>
           </a:p>
           <a:p>
@@ -10712,893 +10873,6 @@
       </p:transition>
     </mc:Fallback>
   </mc:AlternateContent>
-  <p:timing>
-    <p:tnLst>
-      <p:par>
-        <p:cTn id="1" dur="indefinite" restart="never" nodeType="tmRoot">
-          <p:childTnLst>
-            <p:seq concurrent="1" nextAc="seek">
-              <p:cTn id="2" dur="indefinite" nodeType="mainSeq">
-                <p:childTnLst>
-                  <p:par>
-                    <p:cTn id="3" fill="hold">
-                      <p:stCondLst>
-                        <p:cond delay="indefinite"/>
-                      </p:stCondLst>
-                      <p:childTnLst>
-                        <p:par>
-                          <p:cTn id="4" fill="hold">
-                            <p:stCondLst>
-                              <p:cond delay="0"/>
-                            </p:stCondLst>
-                            <p:childTnLst>
-                              <p:par>
-                                <p:cTn id="5" presetID="10" presetClass="entr" presetSubtype="0" fill="hold" nodeType="clickEffect">
-                                  <p:stCondLst>
-                                    <p:cond delay="0"/>
-                                  </p:stCondLst>
-                                  <p:childTnLst>
-                                    <p:set>
-                                      <p:cBhvr>
-                                        <p:cTn id="6" dur="1" fill="hold">
-                                          <p:stCondLst>
-                                            <p:cond delay="0"/>
-                                          </p:stCondLst>
-                                        </p:cTn>
-                                        <p:tgtEl>
-                                          <p:spTgt spid="2">
-                                            <p:txEl>
-                                              <p:pRg st="0" end="0"/>
-                                            </p:txEl>
-                                          </p:spTgt>
-                                        </p:tgtEl>
-                                        <p:attrNameLst>
-                                          <p:attrName>style.visibility</p:attrName>
-                                        </p:attrNameLst>
-                                      </p:cBhvr>
-                                      <p:to>
-                                        <p:strVal val="visible"/>
-                                      </p:to>
-                                    </p:set>
-                                    <p:animEffect transition="in" filter="fade">
-                                      <p:cBhvr>
-                                        <p:cTn id="7" dur="500"/>
-                                        <p:tgtEl>
-                                          <p:spTgt spid="2">
-                                            <p:txEl>
-                                              <p:pRg st="0" end="0"/>
-                                            </p:txEl>
-                                          </p:spTgt>
-                                        </p:tgtEl>
-                                      </p:cBhvr>
-                                    </p:animEffect>
-                                  </p:childTnLst>
-                                </p:cTn>
-                              </p:par>
-                            </p:childTnLst>
-                          </p:cTn>
-                        </p:par>
-                      </p:childTnLst>
-                    </p:cTn>
-                  </p:par>
-                  <p:par>
-                    <p:cTn id="8" fill="hold">
-                      <p:stCondLst>
-                        <p:cond delay="indefinite"/>
-                      </p:stCondLst>
-                      <p:childTnLst>
-                        <p:par>
-                          <p:cTn id="9" fill="hold">
-                            <p:stCondLst>
-                              <p:cond delay="0"/>
-                            </p:stCondLst>
-                            <p:childTnLst>
-                              <p:par>
-                                <p:cTn id="10" presetID="10" presetClass="entr" presetSubtype="0" fill="hold" nodeType="clickEffect">
-                                  <p:stCondLst>
-                                    <p:cond delay="0"/>
-                                  </p:stCondLst>
-                                  <p:childTnLst>
-                                    <p:set>
-                                      <p:cBhvr>
-                                        <p:cTn id="11" dur="1" fill="hold">
-                                          <p:stCondLst>
-                                            <p:cond delay="0"/>
-                                          </p:stCondLst>
-                                        </p:cTn>
-                                        <p:tgtEl>
-                                          <p:spTgt spid="2">
-                                            <p:txEl>
-                                              <p:pRg st="3" end="3"/>
-                                            </p:txEl>
-                                          </p:spTgt>
-                                        </p:tgtEl>
-                                        <p:attrNameLst>
-                                          <p:attrName>style.visibility</p:attrName>
-                                        </p:attrNameLst>
-                                      </p:cBhvr>
-                                      <p:to>
-                                        <p:strVal val="visible"/>
-                                      </p:to>
-                                    </p:set>
-                                    <p:animEffect transition="in" filter="fade">
-                                      <p:cBhvr>
-                                        <p:cTn id="12" dur="500"/>
-                                        <p:tgtEl>
-                                          <p:spTgt spid="2">
-                                            <p:txEl>
-                                              <p:pRg st="3" end="3"/>
-                                            </p:txEl>
-                                          </p:spTgt>
-                                        </p:tgtEl>
-                                      </p:cBhvr>
-                                    </p:animEffect>
-                                  </p:childTnLst>
-                                </p:cTn>
-                              </p:par>
-                            </p:childTnLst>
-                          </p:cTn>
-                        </p:par>
-                      </p:childTnLst>
-                    </p:cTn>
-                  </p:par>
-                  <p:par>
-                    <p:cTn id="13" fill="hold">
-                      <p:stCondLst>
-                        <p:cond delay="indefinite"/>
-                      </p:stCondLst>
-                      <p:childTnLst>
-                        <p:par>
-                          <p:cTn id="14" fill="hold">
-                            <p:stCondLst>
-                              <p:cond delay="0"/>
-                            </p:stCondLst>
-                            <p:childTnLst>
-                              <p:par>
-                                <p:cTn id="15" presetID="10" presetClass="entr" presetSubtype="0" fill="hold" nodeType="clickEffect">
-                                  <p:stCondLst>
-                                    <p:cond delay="0"/>
-                                  </p:stCondLst>
-                                  <p:childTnLst>
-                                    <p:set>
-                                      <p:cBhvr>
-                                        <p:cTn id="16" dur="1" fill="hold">
-                                          <p:stCondLst>
-                                            <p:cond delay="0"/>
-                                          </p:stCondLst>
-                                        </p:cTn>
-                                        <p:tgtEl>
-                                          <p:spTgt spid="2">
-                                            <p:txEl>
-                                              <p:pRg st="1" end="1"/>
-                                            </p:txEl>
-                                          </p:spTgt>
-                                        </p:tgtEl>
-                                        <p:attrNameLst>
-                                          <p:attrName>style.visibility</p:attrName>
-                                        </p:attrNameLst>
-                                      </p:cBhvr>
-                                      <p:to>
-                                        <p:strVal val="visible"/>
-                                      </p:to>
-                                    </p:set>
-                                    <p:animEffect transition="in" filter="fade">
-                                      <p:cBhvr>
-                                        <p:cTn id="17" dur="500"/>
-                                        <p:tgtEl>
-                                          <p:spTgt spid="2">
-                                            <p:txEl>
-                                              <p:pRg st="1" end="1"/>
-                                            </p:txEl>
-                                          </p:spTgt>
-                                        </p:tgtEl>
-                                      </p:cBhvr>
-                                    </p:animEffect>
-                                  </p:childTnLst>
-                                </p:cTn>
-                              </p:par>
-                            </p:childTnLst>
-                          </p:cTn>
-                        </p:par>
-                      </p:childTnLst>
-                    </p:cTn>
-                  </p:par>
-                  <p:par>
-                    <p:cTn id="18" fill="hold">
-                      <p:stCondLst>
-                        <p:cond delay="indefinite"/>
-                      </p:stCondLst>
-                      <p:childTnLst>
-                        <p:par>
-                          <p:cTn id="19" fill="hold">
-                            <p:stCondLst>
-                              <p:cond delay="0"/>
-                            </p:stCondLst>
-                            <p:childTnLst>
-                              <p:par>
-                                <p:cTn id="20" presetID="10" presetClass="entr" presetSubtype="0" fill="hold" nodeType="clickEffect">
-                                  <p:stCondLst>
-                                    <p:cond delay="0"/>
-                                  </p:stCondLst>
-                                  <p:childTnLst>
-                                    <p:set>
-                                      <p:cBhvr>
-                                        <p:cTn id="21" dur="1" fill="hold">
-                                          <p:stCondLst>
-                                            <p:cond delay="0"/>
-                                          </p:stCondLst>
-                                        </p:cTn>
-                                        <p:tgtEl>
-                                          <p:spTgt spid="2">
-                                            <p:txEl>
-                                              <p:pRg st="2" end="2"/>
-                                            </p:txEl>
-                                          </p:spTgt>
-                                        </p:tgtEl>
-                                        <p:attrNameLst>
-                                          <p:attrName>style.visibility</p:attrName>
-                                        </p:attrNameLst>
-                                      </p:cBhvr>
-                                      <p:to>
-                                        <p:strVal val="visible"/>
-                                      </p:to>
-                                    </p:set>
-                                    <p:animEffect transition="in" filter="fade">
-                                      <p:cBhvr>
-                                        <p:cTn id="22" dur="500"/>
-                                        <p:tgtEl>
-                                          <p:spTgt spid="2">
-                                            <p:txEl>
-                                              <p:pRg st="2" end="2"/>
-                                            </p:txEl>
-                                          </p:spTgt>
-                                        </p:tgtEl>
-                                      </p:cBhvr>
-                                    </p:animEffect>
-                                  </p:childTnLst>
-                                </p:cTn>
-                              </p:par>
-                            </p:childTnLst>
-                          </p:cTn>
-                        </p:par>
-                      </p:childTnLst>
-                    </p:cTn>
-                  </p:par>
-                  <p:par>
-                    <p:cTn id="23" fill="hold">
-                      <p:stCondLst>
-                        <p:cond delay="indefinite"/>
-                      </p:stCondLst>
-                      <p:childTnLst>
-                        <p:par>
-                          <p:cTn id="24" fill="hold">
-                            <p:stCondLst>
-                              <p:cond delay="0"/>
-                            </p:stCondLst>
-                            <p:childTnLst>
-                              <p:par>
-                                <p:cTn id="25" presetID="10" presetClass="entr" presetSubtype="0" fill="hold" nodeType="clickEffect">
-                                  <p:stCondLst>
-                                    <p:cond delay="0"/>
-                                  </p:stCondLst>
-                                  <p:childTnLst>
-                                    <p:set>
-                                      <p:cBhvr>
-                                        <p:cTn id="26" dur="1" fill="hold">
-                                          <p:stCondLst>
-                                            <p:cond delay="0"/>
-                                          </p:stCondLst>
-                                        </p:cTn>
-                                        <p:tgtEl>
-                                          <p:spTgt spid="2">
-                                            <p:txEl>
-                                              <p:pRg st="4" end="4"/>
-                                            </p:txEl>
-                                          </p:spTgt>
-                                        </p:tgtEl>
-                                        <p:attrNameLst>
-                                          <p:attrName>style.visibility</p:attrName>
-                                        </p:attrNameLst>
-                                      </p:cBhvr>
-                                      <p:to>
-                                        <p:strVal val="visible"/>
-                                      </p:to>
-                                    </p:set>
-                                    <p:animEffect transition="in" filter="fade">
-                                      <p:cBhvr>
-                                        <p:cTn id="27" dur="500"/>
-                                        <p:tgtEl>
-                                          <p:spTgt spid="2">
-                                            <p:txEl>
-                                              <p:pRg st="4" end="4"/>
-                                            </p:txEl>
-                                          </p:spTgt>
-                                        </p:tgtEl>
-                                      </p:cBhvr>
-                                    </p:animEffect>
-                                  </p:childTnLst>
-                                </p:cTn>
-                              </p:par>
-                              <p:par>
-                                <p:cTn id="28" presetID="10" presetClass="entr" presetSubtype="0" fill="hold" nodeType="withEffect">
-                                  <p:stCondLst>
-                                    <p:cond delay="0"/>
-                                  </p:stCondLst>
-                                  <p:childTnLst>
-                                    <p:set>
-                                      <p:cBhvr>
-                                        <p:cTn id="29" dur="1" fill="hold">
-                                          <p:stCondLst>
-                                            <p:cond delay="0"/>
-                                          </p:stCondLst>
-                                        </p:cTn>
-                                        <p:tgtEl>
-                                          <p:spTgt spid="2">
-                                            <p:txEl>
-                                              <p:pRg st="5" end="5"/>
-                                            </p:txEl>
-                                          </p:spTgt>
-                                        </p:tgtEl>
-                                        <p:attrNameLst>
-                                          <p:attrName>style.visibility</p:attrName>
-                                        </p:attrNameLst>
-                                      </p:cBhvr>
-                                      <p:to>
-                                        <p:strVal val="visible"/>
-                                      </p:to>
-                                    </p:set>
-                                    <p:animEffect transition="in" filter="fade">
-                                      <p:cBhvr>
-                                        <p:cTn id="30" dur="500"/>
-                                        <p:tgtEl>
-                                          <p:spTgt spid="2">
-                                            <p:txEl>
-                                              <p:pRg st="5" end="5"/>
-                                            </p:txEl>
-                                          </p:spTgt>
-                                        </p:tgtEl>
-                                      </p:cBhvr>
-                                    </p:animEffect>
-                                  </p:childTnLst>
-                                </p:cTn>
-                              </p:par>
-                              <p:par>
-                                <p:cTn id="31" presetID="10" presetClass="entr" presetSubtype="0" fill="hold" nodeType="withEffect">
-                                  <p:stCondLst>
-                                    <p:cond delay="0"/>
-                                  </p:stCondLst>
-                                  <p:childTnLst>
-                                    <p:set>
-                                      <p:cBhvr>
-                                        <p:cTn id="32" dur="1" fill="hold">
-                                          <p:stCondLst>
-                                            <p:cond delay="0"/>
-                                          </p:stCondLst>
-                                        </p:cTn>
-                                        <p:tgtEl>
-                                          <p:spTgt spid="2">
-                                            <p:txEl>
-                                              <p:pRg st="6" end="6"/>
-                                            </p:txEl>
-                                          </p:spTgt>
-                                        </p:tgtEl>
-                                        <p:attrNameLst>
-                                          <p:attrName>style.visibility</p:attrName>
-                                        </p:attrNameLst>
-                                      </p:cBhvr>
-                                      <p:to>
-                                        <p:strVal val="visible"/>
-                                      </p:to>
-                                    </p:set>
-                                    <p:animEffect transition="in" filter="fade">
-                                      <p:cBhvr>
-                                        <p:cTn id="33" dur="500"/>
-                                        <p:tgtEl>
-                                          <p:spTgt spid="2">
-                                            <p:txEl>
-                                              <p:pRg st="6" end="6"/>
-                                            </p:txEl>
-                                          </p:spTgt>
-                                        </p:tgtEl>
-                                      </p:cBhvr>
-                                    </p:animEffect>
-                                  </p:childTnLst>
-                                </p:cTn>
-                              </p:par>
-                              <p:par>
-                                <p:cTn id="34" presetID="10" presetClass="entr" presetSubtype="0" fill="hold" nodeType="withEffect">
-                                  <p:stCondLst>
-                                    <p:cond delay="0"/>
-                                  </p:stCondLst>
-                                  <p:childTnLst>
-                                    <p:set>
-                                      <p:cBhvr>
-                                        <p:cTn id="35" dur="1" fill="hold">
-                                          <p:stCondLst>
-                                            <p:cond delay="0"/>
-                                          </p:stCondLst>
-                                        </p:cTn>
-                                        <p:tgtEl>
-                                          <p:spTgt spid="2">
-                                            <p:txEl>
-                                              <p:pRg st="7" end="7"/>
-                                            </p:txEl>
-                                          </p:spTgt>
-                                        </p:tgtEl>
-                                        <p:attrNameLst>
-                                          <p:attrName>style.visibility</p:attrName>
-                                        </p:attrNameLst>
-                                      </p:cBhvr>
-                                      <p:to>
-                                        <p:strVal val="visible"/>
-                                      </p:to>
-                                    </p:set>
-                                    <p:animEffect transition="in" filter="fade">
-                                      <p:cBhvr>
-                                        <p:cTn id="36" dur="500"/>
-                                        <p:tgtEl>
-                                          <p:spTgt spid="2">
-                                            <p:txEl>
-                                              <p:pRg st="7" end="7"/>
-                                            </p:txEl>
-                                          </p:spTgt>
-                                        </p:tgtEl>
-                                      </p:cBhvr>
-                                    </p:animEffect>
-                                  </p:childTnLst>
-                                </p:cTn>
-                              </p:par>
-                              <p:par>
-                                <p:cTn id="37" presetID="10" presetClass="entr" presetSubtype="0" fill="hold" nodeType="withEffect">
-                                  <p:stCondLst>
-                                    <p:cond delay="0"/>
-                                  </p:stCondLst>
-                                  <p:childTnLst>
-                                    <p:set>
-                                      <p:cBhvr>
-                                        <p:cTn id="38" dur="1" fill="hold">
-                                          <p:stCondLst>
-                                            <p:cond delay="0"/>
-                                          </p:stCondLst>
-                                        </p:cTn>
-                                        <p:tgtEl>
-                                          <p:spTgt spid="2">
-                                            <p:txEl>
-                                              <p:pRg st="8" end="8"/>
-                                            </p:txEl>
-                                          </p:spTgt>
-                                        </p:tgtEl>
-                                        <p:attrNameLst>
-                                          <p:attrName>style.visibility</p:attrName>
-                                        </p:attrNameLst>
-                                      </p:cBhvr>
-                                      <p:to>
-                                        <p:strVal val="visible"/>
-                                      </p:to>
-                                    </p:set>
-                                    <p:animEffect transition="in" filter="fade">
-                                      <p:cBhvr>
-                                        <p:cTn id="39" dur="500"/>
-                                        <p:tgtEl>
-                                          <p:spTgt spid="2">
-                                            <p:txEl>
-                                              <p:pRg st="8" end="8"/>
-                                            </p:txEl>
-                                          </p:spTgt>
-                                        </p:tgtEl>
-                                      </p:cBhvr>
-                                    </p:animEffect>
-                                  </p:childTnLst>
-                                </p:cTn>
-                              </p:par>
-                              <p:par>
-                                <p:cTn id="40" presetID="10" presetClass="entr" presetSubtype="0" fill="hold" nodeType="withEffect">
-                                  <p:stCondLst>
-                                    <p:cond delay="0"/>
-                                  </p:stCondLst>
-                                  <p:childTnLst>
-                                    <p:set>
-                                      <p:cBhvr>
-                                        <p:cTn id="41" dur="1" fill="hold">
-                                          <p:stCondLst>
-                                            <p:cond delay="0"/>
-                                          </p:stCondLst>
-                                        </p:cTn>
-                                        <p:tgtEl>
-                                          <p:spTgt spid="2">
-                                            <p:txEl>
-                                              <p:pRg st="9" end="9"/>
-                                            </p:txEl>
-                                          </p:spTgt>
-                                        </p:tgtEl>
-                                        <p:attrNameLst>
-                                          <p:attrName>style.visibility</p:attrName>
-                                        </p:attrNameLst>
-                                      </p:cBhvr>
-                                      <p:to>
-                                        <p:strVal val="visible"/>
-                                      </p:to>
-                                    </p:set>
-                                    <p:animEffect transition="in" filter="fade">
-                                      <p:cBhvr>
-                                        <p:cTn id="42" dur="500"/>
-                                        <p:tgtEl>
-                                          <p:spTgt spid="2">
-                                            <p:txEl>
-                                              <p:pRg st="9" end="9"/>
-                                            </p:txEl>
-                                          </p:spTgt>
-                                        </p:tgtEl>
-                                      </p:cBhvr>
-                                    </p:animEffect>
-                                  </p:childTnLst>
-                                </p:cTn>
-                              </p:par>
-                              <p:par>
-                                <p:cTn id="43" presetID="10" presetClass="entr" presetSubtype="0" fill="hold" nodeType="withEffect">
-                                  <p:stCondLst>
-                                    <p:cond delay="0"/>
-                                  </p:stCondLst>
-                                  <p:childTnLst>
-                                    <p:set>
-                                      <p:cBhvr>
-                                        <p:cTn id="44" dur="1" fill="hold">
-                                          <p:stCondLst>
-                                            <p:cond delay="0"/>
-                                          </p:stCondLst>
-                                        </p:cTn>
-                                        <p:tgtEl>
-                                          <p:spTgt spid="2">
-                                            <p:txEl>
-                                              <p:pRg st="10" end="10"/>
-                                            </p:txEl>
-                                          </p:spTgt>
-                                        </p:tgtEl>
-                                        <p:attrNameLst>
-                                          <p:attrName>style.visibility</p:attrName>
-                                        </p:attrNameLst>
-                                      </p:cBhvr>
-                                      <p:to>
-                                        <p:strVal val="visible"/>
-                                      </p:to>
-                                    </p:set>
-                                    <p:animEffect transition="in" filter="fade">
-                                      <p:cBhvr>
-                                        <p:cTn id="45" dur="500"/>
-                                        <p:tgtEl>
-                                          <p:spTgt spid="2">
-                                            <p:txEl>
-                                              <p:pRg st="10" end="10"/>
-                                            </p:txEl>
-                                          </p:spTgt>
-                                        </p:tgtEl>
-                                      </p:cBhvr>
-                                    </p:animEffect>
-                                  </p:childTnLst>
-                                </p:cTn>
-                              </p:par>
-                              <p:par>
-                                <p:cTn id="46" presetID="10" presetClass="entr" presetSubtype="0" fill="hold" nodeType="withEffect">
-                                  <p:stCondLst>
-                                    <p:cond delay="0"/>
-                                  </p:stCondLst>
-                                  <p:childTnLst>
-                                    <p:set>
-                                      <p:cBhvr>
-                                        <p:cTn id="47" dur="1" fill="hold">
-                                          <p:stCondLst>
-                                            <p:cond delay="0"/>
-                                          </p:stCondLst>
-                                        </p:cTn>
-                                        <p:tgtEl>
-                                          <p:spTgt spid="2">
-                                            <p:txEl>
-                                              <p:pRg st="11" end="11"/>
-                                            </p:txEl>
-                                          </p:spTgt>
-                                        </p:tgtEl>
-                                        <p:attrNameLst>
-                                          <p:attrName>style.visibility</p:attrName>
-                                        </p:attrNameLst>
-                                      </p:cBhvr>
-                                      <p:to>
-                                        <p:strVal val="visible"/>
-                                      </p:to>
-                                    </p:set>
-                                    <p:animEffect transition="in" filter="fade">
-                                      <p:cBhvr>
-                                        <p:cTn id="48" dur="500"/>
-                                        <p:tgtEl>
-                                          <p:spTgt spid="2">
-                                            <p:txEl>
-                                              <p:pRg st="11" end="11"/>
-                                            </p:txEl>
-                                          </p:spTgt>
-                                        </p:tgtEl>
-                                      </p:cBhvr>
-                                    </p:animEffect>
-                                  </p:childTnLst>
-                                </p:cTn>
-                              </p:par>
-                              <p:par>
-                                <p:cTn id="49" presetID="10" presetClass="entr" presetSubtype="0" fill="hold" nodeType="withEffect">
-                                  <p:stCondLst>
-                                    <p:cond delay="0"/>
-                                  </p:stCondLst>
-                                  <p:childTnLst>
-                                    <p:set>
-                                      <p:cBhvr>
-                                        <p:cTn id="50" dur="1" fill="hold">
-                                          <p:stCondLst>
-                                            <p:cond delay="0"/>
-                                          </p:stCondLst>
-                                        </p:cTn>
-                                        <p:tgtEl>
-                                          <p:spTgt spid="2">
-                                            <p:txEl>
-                                              <p:pRg st="12" end="12"/>
-                                            </p:txEl>
-                                          </p:spTgt>
-                                        </p:tgtEl>
-                                        <p:attrNameLst>
-                                          <p:attrName>style.visibility</p:attrName>
-                                        </p:attrNameLst>
-                                      </p:cBhvr>
-                                      <p:to>
-                                        <p:strVal val="visible"/>
-                                      </p:to>
-                                    </p:set>
-                                    <p:animEffect transition="in" filter="fade">
-                                      <p:cBhvr>
-                                        <p:cTn id="51" dur="500"/>
-                                        <p:tgtEl>
-                                          <p:spTgt spid="2">
-                                            <p:txEl>
-                                              <p:pRg st="12" end="12"/>
-                                            </p:txEl>
-                                          </p:spTgt>
-                                        </p:tgtEl>
-                                      </p:cBhvr>
-                                    </p:animEffect>
-                                  </p:childTnLst>
-                                </p:cTn>
-                              </p:par>
-                            </p:childTnLst>
-                          </p:cTn>
-                        </p:par>
-                      </p:childTnLst>
-                    </p:cTn>
-                  </p:par>
-                  <p:par>
-                    <p:cTn id="52" fill="hold">
-                      <p:stCondLst>
-                        <p:cond delay="indefinite"/>
-                      </p:stCondLst>
-                      <p:childTnLst>
-                        <p:par>
-                          <p:cTn id="53" fill="hold">
-                            <p:stCondLst>
-                              <p:cond delay="0"/>
-                            </p:stCondLst>
-                            <p:childTnLst>
-                              <p:par>
-                                <p:cTn id="54" presetID="10" presetClass="entr" presetSubtype="0" fill="hold" nodeType="clickEffect">
-                                  <p:stCondLst>
-                                    <p:cond delay="0"/>
-                                  </p:stCondLst>
-                                  <p:childTnLst>
-                                    <p:set>
-                                      <p:cBhvr>
-                                        <p:cTn id="55" dur="1" fill="hold">
-                                          <p:stCondLst>
-                                            <p:cond delay="0"/>
-                                          </p:stCondLst>
-                                        </p:cTn>
-                                        <p:tgtEl>
-                                          <p:spTgt spid="2">
-                                            <p:txEl>
-                                              <p:pRg st="13" end="13"/>
-                                            </p:txEl>
-                                          </p:spTgt>
-                                        </p:tgtEl>
-                                        <p:attrNameLst>
-                                          <p:attrName>style.visibility</p:attrName>
-                                        </p:attrNameLst>
-                                      </p:cBhvr>
-                                      <p:to>
-                                        <p:strVal val="visible"/>
-                                      </p:to>
-                                    </p:set>
-                                    <p:animEffect transition="in" filter="fade">
-                                      <p:cBhvr>
-                                        <p:cTn id="56" dur="500"/>
-                                        <p:tgtEl>
-                                          <p:spTgt spid="2">
-                                            <p:txEl>
-                                              <p:pRg st="13" end="13"/>
-                                            </p:txEl>
-                                          </p:spTgt>
-                                        </p:tgtEl>
-                                      </p:cBhvr>
-                                    </p:animEffect>
-                                  </p:childTnLst>
-                                </p:cTn>
-                              </p:par>
-                              <p:par>
-                                <p:cTn id="57" presetID="10" presetClass="entr" presetSubtype="0" fill="hold" nodeType="withEffect">
-                                  <p:stCondLst>
-                                    <p:cond delay="0"/>
-                                  </p:stCondLst>
-                                  <p:childTnLst>
-                                    <p:set>
-                                      <p:cBhvr>
-                                        <p:cTn id="58" dur="1" fill="hold">
-                                          <p:stCondLst>
-                                            <p:cond delay="0"/>
-                                          </p:stCondLst>
-                                        </p:cTn>
-                                        <p:tgtEl>
-                                          <p:spTgt spid="2">
-                                            <p:txEl>
-                                              <p:pRg st="14" end="14"/>
-                                            </p:txEl>
-                                          </p:spTgt>
-                                        </p:tgtEl>
-                                        <p:attrNameLst>
-                                          <p:attrName>style.visibility</p:attrName>
-                                        </p:attrNameLst>
-                                      </p:cBhvr>
-                                      <p:to>
-                                        <p:strVal val="visible"/>
-                                      </p:to>
-                                    </p:set>
-                                    <p:animEffect transition="in" filter="fade">
-                                      <p:cBhvr>
-                                        <p:cTn id="59" dur="500"/>
-                                        <p:tgtEl>
-                                          <p:spTgt spid="2">
-                                            <p:txEl>
-                                              <p:pRg st="14" end="14"/>
-                                            </p:txEl>
-                                          </p:spTgt>
-                                        </p:tgtEl>
-                                      </p:cBhvr>
-                                    </p:animEffect>
-                                  </p:childTnLst>
-                                </p:cTn>
-                              </p:par>
-                              <p:par>
-                                <p:cTn id="60" presetID="10" presetClass="entr" presetSubtype="0" fill="hold" nodeType="withEffect">
-                                  <p:stCondLst>
-                                    <p:cond delay="0"/>
-                                  </p:stCondLst>
-                                  <p:childTnLst>
-                                    <p:set>
-                                      <p:cBhvr>
-                                        <p:cTn id="61" dur="1" fill="hold">
-                                          <p:stCondLst>
-                                            <p:cond delay="0"/>
-                                          </p:stCondLst>
-                                        </p:cTn>
-                                        <p:tgtEl>
-                                          <p:spTgt spid="2">
-                                            <p:txEl>
-                                              <p:pRg st="15" end="15"/>
-                                            </p:txEl>
-                                          </p:spTgt>
-                                        </p:tgtEl>
-                                        <p:attrNameLst>
-                                          <p:attrName>style.visibility</p:attrName>
-                                        </p:attrNameLst>
-                                      </p:cBhvr>
-                                      <p:to>
-                                        <p:strVal val="visible"/>
-                                      </p:to>
-                                    </p:set>
-                                    <p:animEffect transition="in" filter="fade">
-                                      <p:cBhvr>
-                                        <p:cTn id="62" dur="500"/>
-                                        <p:tgtEl>
-                                          <p:spTgt spid="2">
-                                            <p:txEl>
-                                              <p:pRg st="15" end="15"/>
-                                            </p:txEl>
-                                          </p:spTgt>
-                                        </p:tgtEl>
-                                      </p:cBhvr>
-                                    </p:animEffect>
-                                  </p:childTnLst>
-                                </p:cTn>
-                              </p:par>
-                            </p:childTnLst>
-                          </p:cTn>
-                        </p:par>
-                      </p:childTnLst>
-                    </p:cTn>
-                  </p:par>
-                  <p:par>
-                    <p:cTn id="63" fill="hold">
-                      <p:stCondLst>
-                        <p:cond delay="indefinite"/>
-                      </p:stCondLst>
-                      <p:childTnLst>
-                        <p:par>
-                          <p:cTn id="64" fill="hold">
-                            <p:stCondLst>
-                              <p:cond delay="0"/>
-                            </p:stCondLst>
-                            <p:childTnLst>
-                              <p:par>
-                                <p:cTn id="65" presetID="10" presetClass="entr" presetSubtype="0" fill="hold" nodeType="clickEffect">
-                                  <p:stCondLst>
-                                    <p:cond delay="0"/>
-                                  </p:stCondLst>
-                                  <p:childTnLst>
-                                    <p:set>
-                                      <p:cBhvr>
-                                        <p:cTn id="66" dur="1" fill="hold">
-                                          <p:stCondLst>
-                                            <p:cond delay="0"/>
-                                          </p:stCondLst>
-                                        </p:cTn>
-                                        <p:tgtEl>
-                                          <p:spTgt spid="2">
-                                            <p:txEl>
-                                              <p:pRg st="16" end="16"/>
-                                            </p:txEl>
-                                          </p:spTgt>
-                                        </p:tgtEl>
-                                        <p:attrNameLst>
-                                          <p:attrName>style.visibility</p:attrName>
-                                        </p:attrNameLst>
-                                      </p:cBhvr>
-                                      <p:to>
-                                        <p:strVal val="visible"/>
-                                      </p:to>
-                                    </p:set>
-                                    <p:animEffect transition="in" filter="fade">
-                                      <p:cBhvr>
-                                        <p:cTn id="67" dur="500"/>
-                                        <p:tgtEl>
-                                          <p:spTgt spid="2">
-                                            <p:txEl>
-                                              <p:pRg st="16" end="16"/>
-                                            </p:txEl>
-                                          </p:spTgt>
-                                        </p:tgtEl>
-                                      </p:cBhvr>
-                                    </p:animEffect>
-                                  </p:childTnLst>
-                                </p:cTn>
-                              </p:par>
-                            </p:childTnLst>
-                          </p:cTn>
-                        </p:par>
-                      </p:childTnLst>
-                    </p:cTn>
-                  </p:par>
-                </p:childTnLst>
-              </p:cTn>
-              <p:prevCondLst>
-                <p:cond evt="onPrev" delay="0">
-                  <p:tgtEl>
-                    <p:sldTgt/>
-                  </p:tgtEl>
-                </p:cond>
-              </p:prevCondLst>
-              <p:nextCondLst>
-                <p:cond evt="onNext" delay="0">
-                  <p:tgtEl>
-                    <p:sldTgt/>
-                  </p:tgtEl>
-                </p:cond>
-              </p:nextCondLst>
-            </p:seq>
-          </p:childTnLst>
-        </p:cTn>
-      </p:par>
-    </p:tnLst>
-  </p:timing>
 </p:sld>
 </file>
 
@@ -12576,772 +11850,363 @@
       </p:transition>
     </mc:Fallback>
   </mc:AlternateContent>
-  <p:timing>
-    <p:tnLst>
-      <p:par>
-        <p:cTn id="1" dur="indefinite" restart="never" nodeType="tmRoot">
-          <p:childTnLst>
-            <p:seq concurrent="1" nextAc="seek">
-              <p:cTn id="2" dur="indefinite" nodeType="mainSeq">
-                <p:childTnLst>
-                  <p:par>
-                    <p:cTn id="3" fill="hold">
-                      <p:stCondLst>
-                        <p:cond delay="indefinite"/>
-                      </p:stCondLst>
-                      <p:childTnLst>
-                        <p:par>
-                          <p:cTn id="4" fill="hold">
-                            <p:stCondLst>
-                              <p:cond delay="0"/>
-                            </p:stCondLst>
-                            <p:childTnLst>
-                              <p:par>
-                                <p:cTn id="5" presetID="10" presetClass="entr" presetSubtype="0" fill="hold" nodeType="clickEffect">
-                                  <p:stCondLst>
-                                    <p:cond delay="0"/>
-                                  </p:stCondLst>
-                                  <p:childTnLst>
-                                    <p:set>
-                                      <p:cBhvr>
-                                        <p:cTn id="6" dur="1" fill="hold">
-                                          <p:stCondLst>
-                                            <p:cond delay="0"/>
-                                          </p:stCondLst>
-                                        </p:cTn>
-                                        <p:tgtEl>
-                                          <p:spTgt spid="2">
-                                            <p:txEl>
-                                              <p:pRg st="0" end="0"/>
-                                            </p:txEl>
-                                          </p:spTgt>
-                                        </p:tgtEl>
-                                        <p:attrNameLst>
-                                          <p:attrName>style.visibility</p:attrName>
-                                        </p:attrNameLst>
-                                      </p:cBhvr>
-                                      <p:to>
-                                        <p:strVal val="visible"/>
-                                      </p:to>
-                                    </p:set>
-                                    <p:animEffect transition="in" filter="fade">
-                                      <p:cBhvr>
-                                        <p:cTn id="7" dur="500"/>
-                                        <p:tgtEl>
-                                          <p:spTgt spid="2">
-                                            <p:txEl>
-                                              <p:pRg st="0" end="0"/>
-                                            </p:txEl>
-                                          </p:spTgt>
-                                        </p:tgtEl>
-                                      </p:cBhvr>
-                                    </p:animEffect>
-                                  </p:childTnLst>
-                                </p:cTn>
-                              </p:par>
-                            </p:childTnLst>
-                          </p:cTn>
-                        </p:par>
-                      </p:childTnLst>
-                    </p:cTn>
-                  </p:par>
-                  <p:par>
-                    <p:cTn id="8" fill="hold">
-                      <p:stCondLst>
-                        <p:cond delay="indefinite"/>
-                      </p:stCondLst>
-                      <p:childTnLst>
-                        <p:par>
-                          <p:cTn id="9" fill="hold">
-                            <p:stCondLst>
-                              <p:cond delay="0"/>
-                            </p:stCondLst>
-                            <p:childTnLst>
-                              <p:par>
-                                <p:cTn id="10" presetID="10" presetClass="entr" presetSubtype="0" fill="hold" nodeType="clickEffect">
-                                  <p:stCondLst>
-                                    <p:cond delay="0"/>
-                                  </p:stCondLst>
-                                  <p:childTnLst>
-                                    <p:set>
-                                      <p:cBhvr>
-                                        <p:cTn id="11" dur="1" fill="hold">
-                                          <p:stCondLst>
-                                            <p:cond delay="0"/>
-                                          </p:stCondLst>
-                                        </p:cTn>
-                                        <p:tgtEl>
-                                          <p:spTgt spid="2">
-                                            <p:txEl>
-                                              <p:pRg st="1" end="1"/>
-                                            </p:txEl>
-                                          </p:spTgt>
-                                        </p:tgtEl>
-                                        <p:attrNameLst>
-                                          <p:attrName>style.visibility</p:attrName>
-                                        </p:attrNameLst>
-                                      </p:cBhvr>
-                                      <p:to>
-                                        <p:strVal val="visible"/>
-                                      </p:to>
-                                    </p:set>
-                                    <p:animEffect transition="in" filter="fade">
-                                      <p:cBhvr>
-                                        <p:cTn id="12" dur="500"/>
-                                        <p:tgtEl>
-                                          <p:spTgt spid="2">
-                                            <p:txEl>
-                                              <p:pRg st="1" end="1"/>
-                                            </p:txEl>
-                                          </p:spTgt>
-                                        </p:tgtEl>
-                                      </p:cBhvr>
-                                    </p:animEffect>
-                                  </p:childTnLst>
-                                </p:cTn>
-                              </p:par>
-                            </p:childTnLst>
-                          </p:cTn>
-                        </p:par>
-                      </p:childTnLst>
-                    </p:cTn>
-                  </p:par>
-                  <p:par>
-                    <p:cTn id="13" fill="hold">
-                      <p:stCondLst>
-                        <p:cond delay="indefinite"/>
-                      </p:stCondLst>
-                      <p:childTnLst>
-                        <p:par>
-                          <p:cTn id="14" fill="hold">
-                            <p:stCondLst>
-                              <p:cond delay="0"/>
-                            </p:stCondLst>
-                            <p:childTnLst>
-                              <p:par>
-                                <p:cTn id="15" presetID="10" presetClass="entr" presetSubtype="0" fill="hold" nodeType="clickEffect">
-                                  <p:stCondLst>
-                                    <p:cond delay="0"/>
-                                  </p:stCondLst>
-                                  <p:childTnLst>
-                                    <p:set>
-                                      <p:cBhvr>
-                                        <p:cTn id="16" dur="1" fill="hold">
-                                          <p:stCondLst>
-                                            <p:cond delay="0"/>
-                                          </p:stCondLst>
-                                        </p:cTn>
-                                        <p:tgtEl>
-                                          <p:spTgt spid="2">
-                                            <p:txEl>
-                                              <p:pRg st="2" end="2"/>
-                                            </p:txEl>
-                                          </p:spTgt>
-                                        </p:tgtEl>
-                                        <p:attrNameLst>
-                                          <p:attrName>style.visibility</p:attrName>
-                                        </p:attrNameLst>
-                                      </p:cBhvr>
-                                      <p:to>
-                                        <p:strVal val="visible"/>
-                                      </p:to>
-                                    </p:set>
-                                    <p:animEffect transition="in" filter="fade">
-                                      <p:cBhvr>
-                                        <p:cTn id="17" dur="500"/>
-                                        <p:tgtEl>
-                                          <p:spTgt spid="2">
-                                            <p:txEl>
-                                              <p:pRg st="2" end="2"/>
-                                            </p:txEl>
-                                          </p:spTgt>
-                                        </p:tgtEl>
-                                      </p:cBhvr>
-                                    </p:animEffect>
-                                  </p:childTnLst>
-                                </p:cTn>
-                              </p:par>
-                            </p:childTnLst>
-                          </p:cTn>
-                        </p:par>
-                      </p:childTnLst>
-                    </p:cTn>
-                  </p:par>
-                  <p:par>
-                    <p:cTn id="18" fill="hold">
-                      <p:stCondLst>
-                        <p:cond delay="indefinite"/>
-                      </p:stCondLst>
-                      <p:childTnLst>
-                        <p:par>
-                          <p:cTn id="19" fill="hold">
-                            <p:stCondLst>
-                              <p:cond delay="0"/>
-                            </p:stCondLst>
-                            <p:childTnLst>
-                              <p:par>
-                                <p:cTn id="20" presetID="10" presetClass="entr" presetSubtype="0" fill="hold" nodeType="clickEffect">
-                                  <p:stCondLst>
-                                    <p:cond delay="0"/>
-                                  </p:stCondLst>
-                                  <p:childTnLst>
-                                    <p:set>
-                                      <p:cBhvr>
-                                        <p:cTn id="21" dur="1" fill="hold">
-                                          <p:stCondLst>
-                                            <p:cond delay="0"/>
-                                          </p:stCondLst>
-                                        </p:cTn>
-                                        <p:tgtEl>
-                                          <p:spTgt spid="2">
-                                            <p:txEl>
-                                              <p:pRg st="3" end="3"/>
-                                            </p:txEl>
-                                          </p:spTgt>
-                                        </p:tgtEl>
-                                        <p:attrNameLst>
-                                          <p:attrName>style.visibility</p:attrName>
-                                        </p:attrNameLst>
-                                      </p:cBhvr>
-                                      <p:to>
-                                        <p:strVal val="visible"/>
-                                      </p:to>
-                                    </p:set>
-                                    <p:animEffect transition="in" filter="fade">
-                                      <p:cBhvr>
-                                        <p:cTn id="22" dur="500"/>
-                                        <p:tgtEl>
-                                          <p:spTgt spid="2">
-                                            <p:txEl>
-                                              <p:pRg st="3" end="3"/>
-                                            </p:txEl>
-                                          </p:spTgt>
-                                        </p:tgtEl>
-                                      </p:cBhvr>
-                                    </p:animEffect>
-                                  </p:childTnLst>
-                                </p:cTn>
-                              </p:par>
-                            </p:childTnLst>
-                          </p:cTn>
-                        </p:par>
-                      </p:childTnLst>
-                    </p:cTn>
-                  </p:par>
-                  <p:par>
-                    <p:cTn id="23" fill="hold">
-                      <p:stCondLst>
-                        <p:cond delay="indefinite"/>
-                      </p:stCondLst>
-                      <p:childTnLst>
-                        <p:par>
-                          <p:cTn id="24" fill="hold">
-                            <p:stCondLst>
-                              <p:cond delay="0"/>
-                            </p:stCondLst>
-                            <p:childTnLst>
-                              <p:par>
-                                <p:cTn id="25" presetID="10" presetClass="entr" presetSubtype="0" fill="hold" nodeType="clickEffect">
-                                  <p:stCondLst>
-                                    <p:cond delay="0"/>
-                                  </p:stCondLst>
-                                  <p:childTnLst>
-                                    <p:set>
-                                      <p:cBhvr>
-                                        <p:cTn id="26" dur="1" fill="hold">
-                                          <p:stCondLst>
-                                            <p:cond delay="0"/>
-                                          </p:stCondLst>
-                                        </p:cTn>
-                                        <p:tgtEl>
-                                          <p:spTgt spid="2">
-                                            <p:txEl>
-                                              <p:pRg st="4" end="4"/>
-                                            </p:txEl>
-                                          </p:spTgt>
-                                        </p:tgtEl>
-                                        <p:attrNameLst>
-                                          <p:attrName>style.visibility</p:attrName>
-                                        </p:attrNameLst>
-                                      </p:cBhvr>
-                                      <p:to>
-                                        <p:strVal val="visible"/>
-                                      </p:to>
-                                    </p:set>
-                                    <p:animEffect transition="in" filter="fade">
-                                      <p:cBhvr>
-                                        <p:cTn id="27" dur="500"/>
-                                        <p:tgtEl>
-                                          <p:spTgt spid="2">
-                                            <p:txEl>
-                                              <p:pRg st="4" end="4"/>
-                                            </p:txEl>
-                                          </p:spTgt>
-                                        </p:tgtEl>
-                                      </p:cBhvr>
-                                    </p:animEffect>
-                                  </p:childTnLst>
-                                </p:cTn>
-                              </p:par>
-                            </p:childTnLst>
-                          </p:cTn>
-                        </p:par>
-                      </p:childTnLst>
-                    </p:cTn>
-                  </p:par>
-                  <p:par>
-                    <p:cTn id="28" fill="hold">
-                      <p:stCondLst>
-                        <p:cond delay="indefinite"/>
-                      </p:stCondLst>
-                      <p:childTnLst>
-                        <p:par>
-                          <p:cTn id="29" fill="hold">
-                            <p:stCondLst>
-                              <p:cond delay="0"/>
-                            </p:stCondLst>
-                            <p:childTnLst>
-                              <p:par>
-                                <p:cTn id="30" presetID="10" presetClass="entr" presetSubtype="0" fill="hold" nodeType="clickEffect">
-                                  <p:stCondLst>
-                                    <p:cond delay="0"/>
-                                  </p:stCondLst>
-                                  <p:childTnLst>
-                                    <p:set>
-                                      <p:cBhvr>
-                                        <p:cTn id="31" dur="1" fill="hold">
-                                          <p:stCondLst>
-                                            <p:cond delay="0"/>
-                                          </p:stCondLst>
-                                        </p:cTn>
-                                        <p:tgtEl>
-                                          <p:spTgt spid="2">
-                                            <p:txEl>
-                                              <p:pRg st="5" end="5"/>
-                                            </p:txEl>
-                                          </p:spTgt>
-                                        </p:tgtEl>
-                                        <p:attrNameLst>
-                                          <p:attrName>style.visibility</p:attrName>
-                                        </p:attrNameLst>
-                                      </p:cBhvr>
-                                      <p:to>
-                                        <p:strVal val="visible"/>
-                                      </p:to>
-                                    </p:set>
-                                    <p:animEffect transition="in" filter="fade">
-                                      <p:cBhvr>
-                                        <p:cTn id="32" dur="500"/>
-                                        <p:tgtEl>
-                                          <p:spTgt spid="2">
-                                            <p:txEl>
-                                              <p:pRg st="5" end="5"/>
-                                            </p:txEl>
-                                          </p:spTgt>
-                                        </p:tgtEl>
-                                      </p:cBhvr>
-                                    </p:animEffect>
-                                  </p:childTnLst>
-                                </p:cTn>
-                              </p:par>
-                            </p:childTnLst>
-                          </p:cTn>
-                        </p:par>
-                      </p:childTnLst>
-                    </p:cTn>
-                  </p:par>
-                  <p:par>
-                    <p:cTn id="33" fill="hold">
-                      <p:stCondLst>
-                        <p:cond delay="indefinite"/>
-                      </p:stCondLst>
-                      <p:childTnLst>
-                        <p:par>
-                          <p:cTn id="34" fill="hold">
-                            <p:stCondLst>
-                              <p:cond delay="0"/>
-                            </p:stCondLst>
-                            <p:childTnLst>
-                              <p:par>
-                                <p:cTn id="35" presetID="10" presetClass="entr" presetSubtype="0" fill="hold" nodeType="clickEffect">
-                                  <p:stCondLst>
-                                    <p:cond delay="0"/>
-                                  </p:stCondLst>
-                                  <p:childTnLst>
-                                    <p:set>
-                                      <p:cBhvr>
-                                        <p:cTn id="36" dur="1" fill="hold">
-                                          <p:stCondLst>
-                                            <p:cond delay="0"/>
-                                          </p:stCondLst>
-                                        </p:cTn>
-                                        <p:tgtEl>
-                                          <p:spTgt spid="2">
-                                            <p:txEl>
-                                              <p:pRg st="6" end="6"/>
-                                            </p:txEl>
-                                          </p:spTgt>
-                                        </p:tgtEl>
-                                        <p:attrNameLst>
-                                          <p:attrName>style.visibility</p:attrName>
-                                        </p:attrNameLst>
-                                      </p:cBhvr>
-                                      <p:to>
-                                        <p:strVal val="visible"/>
-                                      </p:to>
-                                    </p:set>
-                                    <p:animEffect transition="in" filter="fade">
-                                      <p:cBhvr>
-                                        <p:cTn id="37" dur="500"/>
-                                        <p:tgtEl>
-                                          <p:spTgt spid="2">
-                                            <p:txEl>
-                                              <p:pRg st="6" end="6"/>
-                                            </p:txEl>
-                                          </p:spTgt>
-                                        </p:tgtEl>
-                                      </p:cBhvr>
-                                    </p:animEffect>
-                                  </p:childTnLst>
-                                </p:cTn>
-                              </p:par>
-                            </p:childTnLst>
-                          </p:cTn>
-                        </p:par>
-                      </p:childTnLst>
-                    </p:cTn>
-                  </p:par>
-                  <p:par>
-                    <p:cTn id="38" fill="hold">
-                      <p:stCondLst>
-                        <p:cond delay="indefinite"/>
-                      </p:stCondLst>
-                      <p:childTnLst>
-                        <p:par>
-                          <p:cTn id="39" fill="hold">
-                            <p:stCondLst>
-                              <p:cond delay="0"/>
-                            </p:stCondLst>
-                            <p:childTnLst>
-                              <p:par>
-                                <p:cTn id="40" presetID="10" presetClass="entr" presetSubtype="0" fill="hold" nodeType="clickEffect">
-                                  <p:stCondLst>
-                                    <p:cond delay="0"/>
-                                  </p:stCondLst>
-                                  <p:childTnLst>
-                                    <p:set>
-                                      <p:cBhvr>
-                                        <p:cTn id="41" dur="1" fill="hold">
-                                          <p:stCondLst>
-                                            <p:cond delay="0"/>
-                                          </p:stCondLst>
-                                        </p:cTn>
-                                        <p:tgtEl>
-                                          <p:spTgt spid="2">
-                                            <p:txEl>
-                                              <p:pRg st="7" end="7"/>
-                                            </p:txEl>
-                                          </p:spTgt>
-                                        </p:tgtEl>
-                                        <p:attrNameLst>
-                                          <p:attrName>style.visibility</p:attrName>
-                                        </p:attrNameLst>
-                                      </p:cBhvr>
-                                      <p:to>
-                                        <p:strVal val="visible"/>
-                                      </p:to>
-                                    </p:set>
-                                    <p:animEffect transition="in" filter="fade">
-                                      <p:cBhvr>
-                                        <p:cTn id="42" dur="500"/>
-                                        <p:tgtEl>
-                                          <p:spTgt spid="2">
-                                            <p:txEl>
-                                              <p:pRg st="7" end="7"/>
-                                            </p:txEl>
-                                          </p:spTgt>
-                                        </p:tgtEl>
-                                      </p:cBhvr>
-                                    </p:animEffect>
-                                  </p:childTnLst>
-                                </p:cTn>
-                              </p:par>
-                            </p:childTnLst>
-                          </p:cTn>
-                        </p:par>
-                      </p:childTnLst>
-                    </p:cTn>
-                  </p:par>
-                  <p:par>
-                    <p:cTn id="43" fill="hold">
-                      <p:stCondLst>
-                        <p:cond delay="indefinite"/>
-                      </p:stCondLst>
-                      <p:childTnLst>
-                        <p:par>
-                          <p:cTn id="44" fill="hold">
-                            <p:stCondLst>
-                              <p:cond delay="0"/>
-                            </p:stCondLst>
-                            <p:childTnLst>
-                              <p:par>
-                                <p:cTn id="45" presetID="10" presetClass="entr" presetSubtype="0" fill="hold" nodeType="clickEffect">
-                                  <p:stCondLst>
-                                    <p:cond delay="0"/>
-                                  </p:stCondLst>
-                                  <p:childTnLst>
-                                    <p:set>
-                                      <p:cBhvr>
-                                        <p:cTn id="46" dur="1" fill="hold">
-                                          <p:stCondLst>
-                                            <p:cond delay="0"/>
-                                          </p:stCondLst>
-                                        </p:cTn>
-                                        <p:tgtEl>
-                                          <p:spTgt spid="2">
-                                            <p:txEl>
-                                              <p:pRg st="8" end="8"/>
-                                            </p:txEl>
-                                          </p:spTgt>
-                                        </p:tgtEl>
-                                        <p:attrNameLst>
-                                          <p:attrName>style.visibility</p:attrName>
-                                        </p:attrNameLst>
-                                      </p:cBhvr>
-                                      <p:to>
-                                        <p:strVal val="visible"/>
-                                      </p:to>
-                                    </p:set>
-                                    <p:animEffect transition="in" filter="fade">
-                                      <p:cBhvr>
-                                        <p:cTn id="47" dur="500"/>
-                                        <p:tgtEl>
-                                          <p:spTgt spid="2">
-                                            <p:txEl>
-                                              <p:pRg st="8" end="8"/>
-                                            </p:txEl>
-                                          </p:spTgt>
-                                        </p:tgtEl>
-                                      </p:cBhvr>
-                                    </p:animEffect>
-                                  </p:childTnLst>
-                                </p:cTn>
-                              </p:par>
-                            </p:childTnLst>
-                          </p:cTn>
-                        </p:par>
-                      </p:childTnLst>
-                    </p:cTn>
-                  </p:par>
-                  <p:par>
-                    <p:cTn id="48" fill="hold">
-                      <p:stCondLst>
-                        <p:cond delay="indefinite"/>
-                      </p:stCondLst>
-                      <p:childTnLst>
-                        <p:par>
-                          <p:cTn id="49" fill="hold">
-                            <p:stCondLst>
-                              <p:cond delay="0"/>
-                            </p:stCondLst>
-                            <p:childTnLst>
-                              <p:par>
-                                <p:cTn id="50" presetID="10" presetClass="entr" presetSubtype="0" fill="hold" nodeType="clickEffect">
-                                  <p:stCondLst>
-                                    <p:cond delay="0"/>
-                                  </p:stCondLst>
-                                  <p:childTnLst>
-                                    <p:set>
-                                      <p:cBhvr>
-                                        <p:cTn id="51" dur="1" fill="hold">
-                                          <p:stCondLst>
-                                            <p:cond delay="0"/>
-                                          </p:stCondLst>
-                                        </p:cTn>
-                                        <p:tgtEl>
-                                          <p:spTgt spid="2">
-                                            <p:txEl>
-                                              <p:pRg st="9" end="9"/>
-                                            </p:txEl>
-                                          </p:spTgt>
-                                        </p:tgtEl>
-                                        <p:attrNameLst>
-                                          <p:attrName>style.visibility</p:attrName>
-                                        </p:attrNameLst>
-                                      </p:cBhvr>
-                                      <p:to>
-                                        <p:strVal val="visible"/>
-                                      </p:to>
-                                    </p:set>
-                                    <p:animEffect transition="in" filter="fade">
-                                      <p:cBhvr>
-                                        <p:cTn id="52" dur="500"/>
-                                        <p:tgtEl>
-                                          <p:spTgt spid="2">
-                                            <p:txEl>
-                                              <p:pRg st="9" end="9"/>
-                                            </p:txEl>
-                                          </p:spTgt>
-                                        </p:tgtEl>
-                                      </p:cBhvr>
-                                    </p:animEffect>
-                                  </p:childTnLst>
-                                </p:cTn>
-                              </p:par>
-                            </p:childTnLst>
-                          </p:cTn>
-                        </p:par>
-                      </p:childTnLst>
-                    </p:cTn>
-                  </p:par>
-                  <p:par>
-                    <p:cTn id="53" fill="hold">
-                      <p:stCondLst>
-                        <p:cond delay="indefinite"/>
-                      </p:stCondLst>
-                      <p:childTnLst>
-                        <p:par>
-                          <p:cTn id="54" fill="hold">
-                            <p:stCondLst>
-                              <p:cond delay="0"/>
-                            </p:stCondLst>
-                            <p:childTnLst>
-                              <p:par>
-                                <p:cTn id="55" presetID="10" presetClass="entr" presetSubtype="0" fill="hold" nodeType="clickEffect">
-                                  <p:stCondLst>
-                                    <p:cond delay="0"/>
-                                  </p:stCondLst>
-                                  <p:childTnLst>
-                                    <p:set>
-                                      <p:cBhvr>
-                                        <p:cTn id="56" dur="1" fill="hold">
-                                          <p:stCondLst>
-                                            <p:cond delay="0"/>
-                                          </p:stCondLst>
-                                        </p:cTn>
-                                        <p:tgtEl>
-                                          <p:spTgt spid="2">
-                                            <p:txEl>
-                                              <p:pRg st="10" end="10"/>
-                                            </p:txEl>
-                                          </p:spTgt>
-                                        </p:tgtEl>
-                                        <p:attrNameLst>
-                                          <p:attrName>style.visibility</p:attrName>
-                                        </p:attrNameLst>
-                                      </p:cBhvr>
-                                      <p:to>
-                                        <p:strVal val="visible"/>
-                                      </p:to>
-                                    </p:set>
-                                    <p:animEffect transition="in" filter="fade">
-                                      <p:cBhvr>
-                                        <p:cTn id="57" dur="500"/>
-                                        <p:tgtEl>
-                                          <p:spTgt spid="2">
-                                            <p:txEl>
-                                              <p:pRg st="10" end="10"/>
-                                            </p:txEl>
-                                          </p:spTgt>
-                                        </p:tgtEl>
-                                      </p:cBhvr>
-                                    </p:animEffect>
-                                  </p:childTnLst>
-                                </p:cTn>
-                              </p:par>
-                            </p:childTnLst>
-                          </p:cTn>
-                        </p:par>
-                      </p:childTnLst>
-                    </p:cTn>
-                  </p:par>
-                  <p:par>
-                    <p:cTn id="58" fill="hold">
-                      <p:stCondLst>
-                        <p:cond delay="indefinite"/>
-                      </p:stCondLst>
-                      <p:childTnLst>
-                        <p:par>
-                          <p:cTn id="59" fill="hold">
-                            <p:stCondLst>
-                              <p:cond delay="0"/>
-                            </p:stCondLst>
-                            <p:childTnLst>
-                              <p:par>
-                                <p:cTn id="60" presetID="10" presetClass="entr" presetSubtype="0" fill="hold" nodeType="clickEffect">
-                                  <p:stCondLst>
-                                    <p:cond delay="0"/>
-                                  </p:stCondLst>
-                                  <p:childTnLst>
-                                    <p:set>
-                                      <p:cBhvr>
-                                        <p:cTn id="61" dur="1" fill="hold">
-                                          <p:stCondLst>
-                                            <p:cond delay="0"/>
-                                          </p:stCondLst>
-                                        </p:cTn>
-                                        <p:tgtEl>
-                                          <p:spTgt spid="2">
-                                            <p:txEl>
-                                              <p:pRg st="11" end="11"/>
-                                            </p:txEl>
-                                          </p:spTgt>
-                                        </p:tgtEl>
-                                        <p:attrNameLst>
-                                          <p:attrName>style.visibility</p:attrName>
-                                        </p:attrNameLst>
-                                      </p:cBhvr>
-                                      <p:to>
-                                        <p:strVal val="visible"/>
-                                      </p:to>
-                                    </p:set>
-                                    <p:animEffect transition="in" filter="fade">
-                                      <p:cBhvr>
-                                        <p:cTn id="62" dur="500"/>
-                                        <p:tgtEl>
-                                          <p:spTgt spid="2">
-                                            <p:txEl>
-                                              <p:pRg st="11" end="11"/>
-                                            </p:txEl>
-                                          </p:spTgt>
-                                        </p:tgtEl>
-                                      </p:cBhvr>
-                                    </p:animEffect>
-                                  </p:childTnLst>
-                                </p:cTn>
-                              </p:par>
-                            </p:childTnLst>
-                          </p:cTn>
-                        </p:par>
-                      </p:childTnLst>
-                    </p:cTn>
-                  </p:par>
-                </p:childTnLst>
-              </p:cTn>
-              <p:prevCondLst>
-                <p:cond evt="onPrev" delay="0">
-                  <p:tgtEl>
-                    <p:sldTgt/>
-                  </p:tgtEl>
-                </p:cond>
-              </p:prevCondLst>
-              <p:nextCondLst>
-                <p:cond evt="onNext" delay="0">
-                  <p:tgtEl>
-                    <p:sldTgt/>
-                  </p:tgtEl>
-                </p:cond>
-              </p:nextCondLst>
-            </p:seq>
-          </p:childTnLst>
-        </p:cTn>
-      </p:par>
-    </p:tnLst>
-  </p:timing>
 </p:sld>
 </file>
 
 <file path=ppt/slides/slide8.xml><?xml version="1.0" encoding="utf-8"?>
+<p:sld xmlns:a="http://schemas.openxmlformats.org/drawingml/2006/main" xmlns:r="http://schemas.openxmlformats.org/officeDocument/2006/relationships" xmlns:p="http://schemas.openxmlformats.org/presentationml/2006/main">
+  <p:cSld>
+    <p:spTree>
+      <p:nvGrpSpPr>
+        <p:cNvPr id="1" name=""/>
+        <p:cNvGrpSpPr/>
+        <p:nvPr/>
+      </p:nvGrpSpPr>
+      <p:grpSpPr>
+        <a:xfrm>
+          <a:off x="0" y="0"/>
+          <a:ext cx="0" cy="0"/>
+          <a:chOff x="0" y="0"/>
+          <a:chExt cx="0" cy="0"/>
+        </a:xfrm>
+      </p:grpSpPr>
+      <p:sp>
+        <p:nvSpPr>
+          <p:cNvPr id="9" name="TextBox 6">
+            <a:extLst>
+              <a:ext uri="{FF2B5EF4-FFF2-40B4-BE49-F238E27FC236}">
+                <a16:creationId xmlns:a16="http://schemas.microsoft.com/office/drawing/2014/main" id="{225765AD-71F7-DC36-6CE8-E9873BEE1F3F}"/>
+              </a:ext>
+            </a:extLst>
+          </p:cNvPr>
+          <p:cNvSpPr txBox="1"/>
+          <p:nvPr/>
+        </p:nvSpPr>
+        <p:spPr>
+          <a:xfrm>
+            <a:off x="228600" y="200834"/>
+            <a:ext cx="6324600" cy="707886"/>
+          </a:xfrm>
+          <a:prstGeom prst="rect">
+            <a:avLst/>
+          </a:prstGeom>
+          <a:noFill/>
+        </p:spPr>
+        <p:txBody>
+          <a:bodyPr wrap="square" rtlCol="0">
+            <a:spAutoFit/>
+          </a:bodyPr>
+          <a:lstStyle/>
+          <a:p>
+            <a:r>
+              <a:rPr lang="pt-BR" sz="4000" dirty="0">
+                <a:solidFill>
+                  <a:srgbClr val="ED145B"/>
+                </a:solidFill>
+                <a:latin typeface="Gotham HTF" pitchFamily="50" charset="0"/>
+                <a:cs typeface="Gotham HTF Light"/>
+              </a:rPr>
+              <a:t>Datas importantes</a:t>
+            </a:r>
+          </a:p>
+        </p:txBody>
+      </p:sp>
+      <p:sp>
+        <p:nvSpPr>
+          <p:cNvPr id="3" name="CaixaDeTexto 2">
+            <a:extLst>
+              <a:ext uri="{FF2B5EF4-FFF2-40B4-BE49-F238E27FC236}">
+                <a16:creationId xmlns:a16="http://schemas.microsoft.com/office/drawing/2014/main" id="{41D6A5ED-2EC5-FFB6-A726-9EF478AD48FD}"/>
+              </a:ext>
+            </a:extLst>
+          </p:cNvPr>
+          <p:cNvSpPr txBox="1"/>
+          <p:nvPr/>
+        </p:nvSpPr>
+        <p:spPr>
+          <a:xfrm>
+            <a:off x="611560" y="1242855"/>
+            <a:ext cx="8280920" cy="4130361"/>
+          </a:xfrm>
+          <a:prstGeom prst="rect">
+            <a:avLst/>
+          </a:prstGeom>
+          <a:noFill/>
+        </p:spPr>
+        <p:txBody>
+          <a:bodyPr wrap="square">
+            <a:spAutoFit/>
+          </a:bodyPr>
+          <a:lstStyle/>
+          <a:p>
+            <a:pPr>
+              <a:lnSpc>
+                <a:spcPct val="120000"/>
+              </a:lnSpc>
+            </a:pPr>
+            <a:r>
+              <a:rPr lang="de-DE" sz="2000" b="1" dirty="0">
+                <a:latin typeface="Gotham HTF"/>
+                <a:cs typeface="Roboto Light"/>
+              </a:rPr>
+              <a:t>28 de Outubro de 2023 – </a:t>
+            </a:r>
+            <a:r>
+              <a:rPr lang="de-DE" sz="2000" b="1" dirty="0">
+                <a:solidFill>
+                  <a:srgbClr val="ED265B"/>
+                </a:solidFill>
+                <a:latin typeface="Gotham HTF"/>
+                <a:cs typeface="Roboto Light"/>
+              </a:rPr>
+              <a:t>NEXT</a:t>
+            </a:r>
+            <a:r>
+              <a:rPr lang="de-DE" sz="2000" b="1" dirty="0">
+                <a:latin typeface="Gotham HTF"/>
+                <a:cs typeface="Roboto Light"/>
+              </a:rPr>
+              <a:t>;</a:t>
+            </a:r>
+          </a:p>
+          <a:p>
+            <a:pPr>
+              <a:lnSpc>
+                <a:spcPct val="120000"/>
+              </a:lnSpc>
+            </a:pPr>
+            <a:endParaRPr lang="de-DE" sz="2000" b="1" dirty="0">
+              <a:latin typeface="Gotham HTF"/>
+              <a:cs typeface="Roboto Light"/>
+            </a:endParaRPr>
+          </a:p>
+          <a:p>
+            <a:pPr>
+              <a:lnSpc>
+                <a:spcPct val="120000"/>
+              </a:lnSpc>
+            </a:pPr>
+            <a:r>
+              <a:rPr lang="de-DE" sz="2000" b="1" dirty="0">
+                <a:latin typeface="Gotham HTF"/>
+                <a:cs typeface="Roboto Light"/>
+              </a:rPr>
+              <a:t>13 de Novembro de 2023 – </a:t>
+            </a:r>
+            <a:r>
+              <a:rPr lang="de-DE" sz="2000" b="1" dirty="0">
+                <a:solidFill>
+                  <a:srgbClr val="ED265B"/>
+                </a:solidFill>
+                <a:latin typeface="Gotham HTF"/>
+                <a:cs typeface="Roboto Light"/>
+              </a:rPr>
+              <a:t>Kick Off da Global Solutions</a:t>
+            </a:r>
+            <a:r>
+              <a:rPr lang="de-DE" sz="2000" b="1" dirty="0">
+                <a:latin typeface="Gotham HTF"/>
+                <a:cs typeface="Roboto Light"/>
+              </a:rPr>
+              <a:t>;</a:t>
+            </a:r>
+          </a:p>
+          <a:p>
+            <a:pPr>
+              <a:lnSpc>
+                <a:spcPct val="120000"/>
+              </a:lnSpc>
+            </a:pPr>
+            <a:r>
+              <a:rPr lang="de-DE" sz="2000" b="1" dirty="0">
+                <a:latin typeface="Gotham HTF"/>
+                <a:cs typeface="Roboto Light"/>
+              </a:rPr>
+              <a:t>	13 a 24 de Novembro – </a:t>
+            </a:r>
+            <a:r>
+              <a:rPr lang="de-DE" sz="2000" b="1" dirty="0">
+                <a:solidFill>
+                  <a:srgbClr val="ED265B"/>
+                </a:solidFill>
+                <a:latin typeface="Gotham HTF"/>
+                <a:cs typeface="Roboto Light"/>
+              </a:rPr>
+              <a:t>Global Solutions</a:t>
+            </a:r>
+            <a:r>
+              <a:rPr lang="de-DE" sz="2000" b="1" dirty="0">
+                <a:latin typeface="Gotham HTF"/>
+                <a:cs typeface="Roboto Light"/>
+              </a:rPr>
+              <a:t>;</a:t>
+            </a:r>
+          </a:p>
+          <a:p>
+            <a:pPr>
+              <a:lnSpc>
+                <a:spcPct val="120000"/>
+              </a:lnSpc>
+            </a:pPr>
+            <a:endParaRPr lang="de-DE" sz="2000" b="1" dirty="0">
+              <a:latin typeface="Gotham HTF"/>
+              <a:cs typeface="Roboto Light"/>
+            </a:endParaRPr>
+          </a:p>
+          <a:p>
+            <a:pPr>
+              <a:lnSpc>
+                <a:spcPct val="120000"/>
+              </a:lnSpc>
+            </a:pPr>
+            <a:r>
+              <a:rPr lang="de-DE" sz="2000" b="1" dirty="0">
+                <a:latin typeface="Gotham HTF"/>
+                <a:cs typeface="Roboto Light"/>
+              </a:rPr>
+              <a:t>23 a 24 de Novembro – </a:t>
+            </a:r>
+            <a:r>
+              <a:rPr lang="de-DE" sz="2000" b="1" dirty="0">
+                <a:solidFill>
+                  <a:srgbClr val="ED265B"/>
+                </a:solidFill>
+                <a:latin typeface="Gotham HTF"/>
+                <a:cs typeface="Roboto Light"/>
+              </a:rPr>
+              <a:t>Período de Solicitação das Substitutivas</a:t>
+            </a:r>
+            <a:r>
+              <a:rPr lang="de-DE" sz="2000" b="1" dirty="0">
+                <a:latin typeface="Gotham HTF"/>
+                <a:cs typeface="Roboto Light"/>
+              </a:rPr>
+              <a:t>;</a:t>
+            </a:r>
+          </a:p>
+          <a:p>
+            <a:pPr>
+              <a:lnSpc>
+                <a:spcPct val="120000"/>
+              </a:lnSpc>
+            </a:pPr>
+            <a:endParaRPr lang="de-DE" sz="2000" b="1" dirty="0">
+              <a:latin typeface="Gotham HTF"/>
+              <a:cs typeface="Roboto Light"/>
+            </a:endParaRPr>
+          </a:p>
+          <a:p>
+            <a:pPr>
+              <a:lnSpc>
+                <a:spcPct val="120000"/>
+              </a:lnSpc>
+            </a:pPr>
+            <a:r>
+              <a:rPr lang="de-DE" sz="2000" b="1" dirty="0">
+                <a:latin typeface="Gotham HTF"/>
+                <a:cs typeface="Roboto Light"/>
+              </a:rPr>
+              <a:t>27 de Novembro a 01 de Dezembro – </a:t>
+            </a:r>
+            <a:r>
+              <a:rPr lang="de-DE" sz="2000" b="1" dirty="0">
+                <a:solidFill>
+                  <a:srgbClr val="ED265B"/>
+                </a:solidFill>
+                <a:latin typeface="Gotham HTF"/>
+                <a:cs typeface="Roboto Light"/>
+              </a:rPr>
+              <a:t>Aplicação das Substitutívas</a:t>
+            </a:r>
+            <a:r>
+              <a:rPr lang="de-DE" sz="2000" b="1" dirty="0">
+                <a:latin typeface="Gotham HTF"/>
+                <a:cs typeface="Roboto Light"/>
+              </a:rPr>
+              <a:t>;</a:t>
+            </a:r>
+          </a:p>
+          <a:p>
+            <a:pPr>
+              <a:lnSpc>
+                <a:spcPct val="120000"/>
+              </a:lnSpc>
+            </a:pPr>
+            <a:endParaRPr lang="de-DE" sz="2000" b="1" dirty="0">
+              <a:latin typeface="Gotham HTF"/>
+              <a:cs typeface="Roboto Light"/>
+            </a:endParaRPr>
+          </a:p>
+          <a:p>
+            <a:pPr>
+              <a:lnSpc>
+                <a:spcPct val="120000"/>
+              </a:lnSpc>
+            </a:pPr>
+            <a:r>
+              <a:rPr lang="de-DE" sz="2000" b="1" dirty="0">
+                <a:latin typeface="Gotham HTF"/>
+                <a:cs typeface="Roboto Light"/>
+              </a:rPr>
+              <a:t>04 a 08 de Dezembro – </a:t>
+            </a:r>
+            <a:r>
+              <a:rPr lang="de-DE" sz="2000" b="1" dirty="0">
+                <a:solidFill>
+                  <a:srgbClr val="ED265B"/>
+                </a:solidFill>
+                <a:latin typeface="Gotham HTF"/>
+                <a:cs typeface="Roboto Light"/>
+              </a:rPr>
+              <a:t>Aplicação dos Exames</a:t>
+            </a:r>
+            <a:r>
+              <a:rPr lang="de-DE" sz="2000" b="1" dirty="0">
+                <a:latin typeface="Gotham HTF"/>
+                <a:cs typeface="Roboto Light"/>
+              </a:rPr>
+              <a:t>;</a:t>
+            </a:r>
+          </a:p>
+          <a:p>
+            <a:pPr>
+              <a:lnSpc>
+                <a:spcPct val="120000"/>
+              </a:lnSpc>
+            </a:pPr>
+            <a:endParaRPr lang="de-DE" sz="2000" b="1" dirty="0">
+              <a:latin typeface="Gotham HTF"/>
+              <a:cs typeface="Roboto Light"/>
+            </a:endParaRPr>
+          </a:p>
+        </p:txBody>
+      </p:sp>
+    </p:spTree>
+    <p:extLst>
+      <p:ext uri="{BB962C8B-B14F-4D97-AF65-F5344CB8AC3E}">
+        <p14:creationId xmlns:p14="http://schemas.microsoft.com/office/powerpoint/2010/main" val="2757266961"/>
+      </p:ext>
+    </p:extLst>
+  </p:cSld>
+  <p:clrMapOvr>
+    <a:masterClrMapping/>
+  </p:clrMapOvr>
+  <mc:AlternateContent xmlns:mc="http://schemas.openxmlformats.org/markup-compatibility/2006" xmlns:p14="http://schemas.microsoft.com/office/powerpoint/2010/main">
+    <mc:Choice Requires="p14">
+      <p:transition spd="med" p14:dur="700">
+        <p:fade/>
+      </p:transition>
+    </mc:Choice>
+    <mc:Fallback xmlns="">
+      <p:transition spd="med">
+        <p:fade/>
+      </p:transition>
+    </mc:Fallback>
+  </mc:AlternateContent>
+</p:sld>
+</file>
+
+<file path=ppt/slides/slide9.xml><?xml version="1.0" encoding="utf-8"?>
 <p:sld xmlns:a="http://schemas.openxmlformats.org/drawingml/2006/main" xmlns:r="http://schemas.openxmlformats.org/officeDocument/2006/relationships" xmlns:p="http://schemas.openxmlformats.org/presentationml/2006/main">
   <p:cSld>
     <p:spTree>
@@ -13417,7 +12282,7 @@
             </p:custDataLst>
             <p:extLst>
               <p:ext uri="{D42A27DB-BD31-4B8C-83A1-F6EECF244321}">
-                <p14:modId xmlns:p14="http://schemas.microsoft.com/office/powerpoint/2010/main" val="3047091223"/>
+                <p14:modId xmlns:p14="http://schemas.microsoft.com/office/powerpoint/2010/main" val="636185336"/>
               </p:ext>
             </p:extLst>
           </p:nvPr>
@@ -14060,16 +12925,10 @@
                       </a:pPr>
                       <a:r>
                         <a:rPr lang="pt-BR" sz="900" dirty="0">
-                          <a:solidFill>
-                            <a:srgbClr val="FF0000"/>
-                          </a:solidFill>
                           <a:latin typeface="Gotham HTF"/>
                         </a:rPr>
-                        <a:t>Checkpoint 01</a:t>
+                        <a:t>Aula 06 – Protocolo MQTT</a:t>
                       </a:r>
-                      <a:endParaRPr lang="pt-BR" sz="900" dirty="0">
-                        <a:latin typeface="Gotham HTF"/>
-                      </a:endParaRPr>
                     </a:p>
                   </a:txBody>
                   <a:tcPr/>
@@ -14170,9 +13029,30 @@
                       </a:pPr>
                       <a:r>
                         <a:rPr lang="pt-BR" sz="900" dirty="0">
+                          <a:solidFill>
+                            <a:schemeClr val="tx1"/>
+                          </a:solidFill>
                           <a:latin typeface="Gotham HTF"/>
                         </a:rPr>
-                        <a:t>Aula 06 – Protocolo MQTT</a:t>
+                        <a:t>Aula 07 – Plataformas </a:t>
+                      </a:r>
+                      <a:r>
+                        <a:rPr lang="pt-BR" sz="900" dirty="0" err="1">
+                          <a:solidFill>
+                            <a:schemeClr val="tx1"/>
+                          </a:solidFill>
+                          <a:latin typeface="Gotham HTF"/>
+                        </a:rPr>
+                        <a:t>IoT</a:t>
+                      </a:r>
+                      <a:r>
+                        <a:rPr lang="pt-BR" sz="900" dirty="0">
+                          <a:solidFill>
+                            <a:schemeClr val="tx1"/>
+                          </a:solidFill>
+                          <a:latin typeface="Gotham HTF"/>
+                        </a:rPr>
+                        <a:t> – Conectores </a:t>
                       </a:r>
                     </a:p>
                   </a:txBody>
@@ -14279,25 +13159,7 @@
                           </a:solidFill>
                           <a:latin typeface="Gotham HTF"/>
                         </a:rPr>
-                        <a:t>Aula 07 – Plataformas </a:t>
-                      </a:r>
-                      <a:r>
-                        <a:rPr lang="pt-BR" sz="900" dirty="0" err="1">
-                          <a:solidFill>
-                            <a:schemeClr val="tx1"/>
-                          </a:solidFill>
-                          <a:latin typeface="Gotham HTF"/>
-                        </a:rPr>
-                        <a:t>IoT</a:t>
-                      </a:r>
-                      <a:r>
-                        <a:rPr lang="pt-BR" sz="900" dirty="0">
-                          <a:solidFill>
-                            <a:schemeClr val="tx1"/>
-                          </a:solidFill>
-                          <a:latin typeface="Gotham HTF"/>
-                        </a:rPr>
-                        <a:t> – Conectores </a:t>
+                        <a:t>Aula 08 – Plataformas IoT – Conectores </a:t>
                       </a:r>
                     </a:p>
                   </a:txBody>
@@ -14386,30 +13248,15 @@
                       <a:r>
                         <a:rPr lang="pt-BR" sz="900" dirty="0">
                           <a:solidFill>
-                            <a:schemeClr val="tx1"/>
+                            <a:srgbClr val="FF0000"/>
                           </a:solidFill>
                           <a:latin typeface="Gotham HTF"/>
                         </a:rPr>
-                        <a:t>Aula 08 – Plataformas </a:t>
+                        <a:t>Checkpoint 01</a:t>
                       </a:r>
-                      <a:r>
-                        <a:rPr lang="pt-BR" sz="900" dirty="0" err="1">
-                          <a:solidFill>
-                            <a:schemeClr val="tx1"/>
-                          </a:solidFill>
-                          <a:latin typeface="Gotham HTF"/>
-                        </a:rPr>
-                        <a:t>IoT</a:t>
-                      </a:r>
-                      <a:r>
-                        <a:rPr lang="pt-BR" sz="900" dirty="0">
-                          <a:solidFill>
-                            <a:schemeClr val="tx1"/>
-                          </a:solidFill>
-                          <a:latin typeface="Gotham HTF"/>
-                        </a:rPr>
-                        <a:t> – Conectores </a:t>
-                      </a:r>
+                      <a:endParaRPr lang="pt-BR" sz="900" dirty="0">
+                        <a:latin typeface="Gotham HTF"/>
+                      </a:endParaRPr>
                     </a:p>
                   </a:txBody>
                   <a:tcPr/>
@@ -14704,8 +13551,23 @@
                           </a:solidFill>
                           <a:latin typeface="Gotham HTF"/>
                         </a:rPr>
-                        <a:t>Checkpoint 2</a:t>
+                        <a:t>Preparativo </a:t>
                       </a:r>
+                      <a:r>
+                        <a:rPr lang="pt-BR" sz="900">
+                          <a:solidFill>
+                            <a:srgbClr val="FF0000"/>
+                          </a:solidFill>
+                          <a:latin typeface="Gotham HTF"/>
+                        </a:rPr>
+                        <a:t>pro Next ?</a:t>
+                      </a:r>
+                      <a:endParaRPr lang="pt-BR" sz="900" dirty="0">
+                        <a:solidFill>
+                          <a:srgbClr val="FF0000"/>
+                        </a:solidFill>
+                        <a:latin typeface="Gotham HTF"/>
+                      </a:endParaRPr>
                     </a:p>
                   </a:txBody>
                   <a:tcPr/>
@@ -14793,11 +13655,11 @@
                       <a:r>
                         <a:rPr lang="pt-BR" sz="900" dirty="0">
                           <a:solidFill>
-                            <a:schemeClr val="tx1"/>
+                            <a:srgbClr val="FF0000"/>
                           </a:solidFill>
                           <a:latin typeface="Gotham HTF"/>
                         </a:rPr>
-                        <a:t>Aula 10 – Técnicas avançadas em dispositivos IoT</a:t>
+                        <a:t>Checkpoint 2</a:t>
                       </a:r>
                     </a:p>
                   </a:txBody>
@@ -14939,126 +13801,6 @@
     <p:extLst>
       <p:ext uri="{BB962C8B-B14F-4D97-AF65-F5344CB8AC3E}">
         <p14:creationId xmlns:p14="http://schemas.microsoft.com/office/powerpoint/2010/main" val="1034089890"/>
-      </p:ext>
-    </p:extLst>
-  </p:cSld>
-  <p:clrMapOvr>
-    <a:masterClrMapping/>
-  </p:clrMapOvr>
-  <mc:AlternateContent xmlns:mc="http://schemas.openxmlformats.org/markup-compatibility/2006" xmlns:p14="http://schemas.microsoft.com/office/powerpoint/2010/main">
-    <mc:Choice Requires="p14">
-      <p:transition spd="med" p14:dur="700">
-        <p:fade/>
-      </p:transition>
-    </mc:Choice>
-    <mc:Fallback xmlns="">
-      <p:transition spd="med">
-        <p:fade/>
-      </p:transition>
-    </mc:Fallback>
-  </mc:AlternateContent>
-</p:sld>
-</file>
-
-<file path=ppt/slides/slide9.xml><?xml version="1.0" encoding="utf-8"?>
-<p:sld xmlns:a="http://schemas.openxmlformats.org/drawingml/2006/main" xmlns:r="http://schemas.openxmlformats.org/officeDocument/2006/relationships" xmlns:p="http://schemas.openxmlformats.org/presentationml/2006/main">
-  <p:cSld>
-    <p:spTree>
-      <p:nvGrpSpPr>
-        <p:cNvPr id="1" name=""/>
-        <p:cNvGrpSpPr/>
-        <p:nvPr/>
-      </p:nvGrpSpPr>
-      <p:grpSpPr>
-        <a:xfrm>
-          <a:off x="0" y="0"/>
-          <a:ext cx="0" cy="0"/>
-          <a:chOff x="0" y="0"/>
-          <a:chExt cx="0" cy="0"/>
-        </a:xfrm>
-      </p:grpSpPr>
-      <p:sp>
-        <p:nvSpPr>
-          <p:cNvPr id="9" name="TextBox 6">
-            <a:extLst>
-              <a:ext uri="{FF2B5EF4-FFF2-40B4-BE49-F238E27FC236}">
-                <a16:creationId xmlns:a16="http://schemas.microsoft.com/office/drawing/2014/main" id="{225765AD-71F7-DC36-6CE8-E9873BEE1F3F}"/>
-              </a:ext>
-            </a:extLst>
-          </p:cNvPr>
-          <p:cNvSpPr txBox="1"/>
-          <p:nvPr/>
-        </p:nvSpPr>
-        <p:spPr>
-          <a:xfrm>
-            <a:off x="228600" y="133350"/>
-            <a:ext cx="6324600" cy="707886"/>
-          </a:xfrm>
-          <a:prstGeom prst="rect">
-            <a:avLst/>
-          </a:prstGeom>
-          <a:noFill/>
-        </p:spPr>
-        <p:txBody>
-          <a:bodyPr wrap="square" rtlCol="0">
-            <a:spAutoFit/>
-          </a:bodyPr>
-          <a:lstStyle/>
-          <a:p>
-            <a:r>
-              <a:rPr lang="pt-BR" sz="4000" dirty="0" err="1">
-                <a:solidFill>
-                  <a:srgbClr val="ED145B"/>
-                </a:solidFill>
-                <a:latin typeface="Gotham HTF" pitchFamily="50" charset="0"/>
-                <a:cs typeface="Gotham HTF Light"/>
-              </a:rPr>
-              <a:t>Bibliográfia</a:t>
-            </a:r>
-            <a:endParaRPr lang="pt-BR" sz="4000" dirty="0">
-              <a:solidFill>
-                <a:srgbClr val="ED145B"/>
-              </a:solidFill>
-              <a:latin typeface="Gotham HTF" pitchFamily="50" charset="0"/>
-              <a:cs typeface="Gotham HTF Light"/>
-            </a:endParaRPr>
-          </a:p>
-        </p:txBody>
-      </p:sp>
-      <p:pic>
-        <p:nvPicPr>
-          <p:cNvPr id="7" name="Imagem 6">
-            <a:extLst>
-              <a:ext uri="{FF2B5EF4-FFF2-40B4-BE49-F238E27FC236}">
-                <a16:creationId xmlns:a16="http://schemas.microsoft.com/office/drawing/2014/main" id="{A7BE0070-EA4B-7AC3-A077-DFC3A66F6F07}"/>
-              </a:ext>
-            </a:extLst>
-          </p:cNvPr>
-          <p:cNvPicPr>
-            <a:picLocks noChangeAspect="1"/>
-          </p:cNvPicPr>
-          <p:nvPr/>
-        </p:nvPicPr>
-        <p:blipFill>
-          <a:blip r:embed="rId2"/>
-          <a:stretch>
-            <a:fillRect/>
-          </a:stretch>
-        </p:blipFill>
-        <p:spPr>
-          <a:xfrm>
-            <a:off x="216024" y="1572056"/>
-            <a:ext cx="8532440" cy="4000632"/>
-          </a:xfrm>
-          <a:prstGeom prst="rect">
-            <a:avLst/>
-          </a:prstGeom>
-        </p:spPr>
-      </p:pic>
-    </p:spTree>
-    <p:extLst>
-      <p:ext uri="{BB962C8B-B14F-4D97-AF65-F5344CB8AC3E}">
-        <p14:creationId xmlns:p14="http://schemas.microsoft.com/office/powerpoint/2010/main" val="1861455873"/>
       </p:ext>
     </p:extLst>
   </p:cSld>

</xml_diff>